<commit_message>
figure & pptx update
git-svn-id: https://svn.research.cc.gatech.edu/macsim/trunk@179 76505255-db3a-46bb-8524-017587b0c4bf
</commit_message>
<xml_diff>
--- a/doc/latex/figs/fig.pptx
+++ b/doc/latex/figs/fig.pptx
@@ -294,7 +294,7 @@
           <a:p>
             <a:fld id="{8415CA18-29E3-446E-9C3A-1247C8AC240A}" type="datetimeFigureOut">
               <a:rPr lang="en-US" smtClean="0"/>
-              <a:t>12/8/2011</a:t>
+              <a:t>12/9/2011</a:t>
             </a:fld>
             <a:endParaRPr lang="en-US"/>
           </a:p>
@@ -464,7 +464,7 @@
           <a:p>
             <a:fld id="{8415CA18-29E3-446E-9C3A-1247C8AC240A}" type="datetimeFigureOut">
               <a:rPr lang="en-US" smtClean="0"/>
-              <a:t>12/8/2011</a:t>
+              <a:t>12/9/2011</a:t>
             </a:fld>
             <a:endParaRPr lang="en-US"/>
           </a:p>
@@ -644,7 +644,7 @@
           <a:p>
             <a:fld id="{8415CA18-29E3-446E-9C3A-1247C8AC240A}" type="datetimeFigureOut">
               <a:rPr lang="en-US" smtClean="0"/>
-              <a:t>12/8/2011</a:t>
+              <a:t>12/9/2011</a:t>
             </a:fld>
             <a:endParaRPr lang="en-US"/>
           </a:p>
@@ -814,7 +814,7 @@
           <a:p>
             <a:fld id="{8415CA18-29E3-446E-9C3A-1247C8AC240A}" type="datetimeFigureOut">
               <a:rPr lang="en-US" smtClean="0"/>
-              <a:t>12/8/2011</a:t>
+              <a:t>12/9/2011</a:t>
             </a:fld>
             <a:endParaRPr lang="en-US"/>
           </a:p>
@@ -1060,7 +1060,7 @@
           <a:p>
             <a:fld id="{8415CA18-29E3-446E-9C3A-1247C8AC240A}" type="datetimeFigureOut">
               <a:rPr lang="en-US" smtClean="0"/>
-              <a:t>12/8/2011</a:t>
+              <a:t>12/9/2011</a:t>
             </a:fld>
             <a:endParaRPr lang="en-US"/>
           </a:p>
@@ -1348,7 +1348,7 @@
           <a:p>
             <a:fld id="{8415CA18-29E3-446E-9C3A-1247C8AC240A}" type="datetimeFigureOut">
               <a:rPr lang="en-US" smtClean="0"/>
-              <a:t>12/8/2011</a:t>
+              <a:t>12/9/2011</a:t>
             </a:fld>
             <a:endParaRPr lang="en-US"/>
           </a:p>
@@ -1770,7 +1770,7 @@
           <a:p>
             <a:fld id="{8415CA18-29E3-446E-9C3A-1247C8AC240A}" type="datetimeFigureOut">
               <a:rPr lang="en-US" smtClean="0"/>
-              <a:t>12/8/2011</a:t>
+              <a:t>12/9/2011</a:t>
             </a:fld>
             <a:endParaRPr lang="en-US"/>
           </a:p>
@@ -1888,7 +1888,7 @@
           <a:p>
             <a:fld id="{8415CA18-29E3-446E-9C3A-1247C8AC240A}" type="datetimeFigureOut">
               <a:rPr lang="en-US" smtClean="0"/>
-              <a:t>12/8/2011</a:t>
+              <a:t>12/9/2011</a:t>
             </a:fld>
             <a:endParaRPr lang="en-US"/>
           </a:p>
@@ -1983,7 +1983,7 @@
           <a:p>
             <a:fld id="{8415CA18-29E3-446E-9C3A-1247C8AC240A}" type="datetimeFigureOut">
               <a:rPr lang="en-US" smtClean="0"/>
-              <a:t>12/8/2011</a:t>
+              <a:t>12/9/2011</a:t>
             </a:fld>
             <a:endParaRPr lang="en-US"/>
           </a:p>
@@ -2260,7 +2260,7 @@
           <a:p>
             <a:fld id="{8415CA18-29E3-446E-9C3A-1247C8AC240A}" type="datetimeFigureOut">
               <a:rPr lang="en-US" smtClean="0"/>
-              <a:t>12/8/2011</a:t>
+              <a:t>12/9/2011</a:t>
             </a:fld>
             <a:endParaRPr lang="en-US"/>
           </a:p>
@@ -2513,7 +2513,7 @@
           <a:p>
             <a:fld id="{8415CA18-29E3-446E-9C3A-1247C8AC240A}" type="datetimeFigureOut">
               <a:rPr lang="en-US" smtClean="0"/>
-              <a:t>12/8/2011</a:t>
+              <a:t>12/9/2011</a:t>
             </a:fld>
             <a:endParaRPr lang="en-US"/>
           </a:p>
@@ -2726,7 +2726,7 @@
           <a:p>
             <a:fld id="{8415CA18-29E3-446E-9C3A-1247C8AC240A}" type="datetimeFigureOut">
               <a:rPr lang="en-US" smtClean="0"/>
-              <a:t>12/8/2011</a:t>
+              <a:t>12/9/2011</a:t>
             </a:fld>
             <a:endParaRPr lang="en-US"/>
           </a:p>
@@ -3149,6 +3149,13 @@
   <p:clrMapOvr>
     <a:masterClrMapping/>
   </p:clrMapOvr>
+  <p:timing>
+    <p:tnLst>
+      <p:par>
+        <p:cTn id="1" dur="indefinite" restart="never" nodeType="tmRoot"/>
+      </p:par>
+    </p:tnLst>
+  </p:timing>
 </p:sld>
 </file>
 
@@ -16299,41 +16306,1409 @@
           <a:chExt cx="0" cy="0"/>
         </a:xfrm>
       </p:grpSpPr>
+      <p:graphicFrame>
+        <p:nvGraphicFramePr>
+          <p:cNvPr id="9" name="Table 8"/>
+          <p:cNvGraphicFramePr>
+            <a:graphicFrameLocks noGrp="1"/>
+          </p:cNvGraphicFramePr>
+          <p:nvPr>
+            <p:extLst>
+              <p:ext uri="{D42A27DB-BD31-4B8C-83A1-F6EECF244321}">
+                <p14:modId xmlns:p14="http://schemas.microsoft.com/office/powerpoint/2010/main" val="1276747717"/>
+              </p:ext>
+            </p:extLst>
+          </p:nvPr>
+        </p:nvGraphicFramePr>
+        <p:xfrm>
+          <a:off x="3581400" y="2209800"/>
+          <a:ext cx="2667001" cy="1737360"/>
+        </p:xfrm>
+        <a:graphic>
+          <a:graphicData uri="http://schemas.openxmlformats.org/drawingml/2006/table">
+            <a:tbl>
+              <a:tblPr firstRow="1" bandRow="1">
+                <a:tableStyleId>{5C22544A-7EE6-4342-B048-85BDC9FD1C3A}</a:tableStyleId>
+              </a:tblPr>
+              <a:tblGrid>
+                <a:gridCol w="1219200"/>
+                <a:gridCol w="1447801"/>
+              </a:tblGrid>
+              <a:tr h="1371600">
+                <a:tc>
+                  <a:txBody>
+                    <a:bodyPr/>
+                    <a:lstStyle/>
+                    <a:p>
+                      <a:r>
+                        <a:rPr lang="en-US" sz="900" b="0" dirty="0" smtClean="0">
+                          <a:solidFill>
+                            <a:schemeClr val="tx1"/>
+                          </a:solidFill>
+                          <a:latin typeface="Courier New" pitchFamily="49" charset="0"/>
+                          <a:cs typeface="Courier New" pitchFamily="49" charset="0"/>
+                        </a:rPr>
+                        <a:t>CPU</a:t>
+                      </a:r>
+                    </a:p>
+                    <a:p>
+                      <a:endParaRPr lang="en-US" sz="900" b="0" dirty="0" smtClean="0">
+                        <a:solidFill>
+                          <a:schemeClr val="tx1"/>
+                        </a:solidFill>
+                        <a:latin typeface="Courier New" pitchFamily="49" charset="0"/>
+                        <a:cs typeface="Courier New" pitchFamily="49" charset="0"/>
+                      </a:endParaRPr>
+                    </a:p>
+                    <a:p>
+                      <a:r>
+                        <a:rPr lang="en-US" sz="900" b="0" dirty="0" smtClean="0">
+                          <a:solidFill>
+                            <a:schemeClr val="tx1"/>
+                          </a:solidFill>
+                          <a:latin typeface="Courier New" pitchFamily="49" charset="0"/>
+                          <a:cs typeface="Courier New" pitchFamily="49" charset="0"/>
+                        </a:rPr>
+                        <a:t>4 x86</a:t>
+                      </a:r>
+                    </a:p>
+                    <a:p>
+                      <a:r>
+                        <a:rPr lang="en-US" sz="900" b="0" dirty="0" smtClean="0">
+                          <a:solidFill>
+                            <a:schemeClr val="tx1"/>
+                          </a:solidFill>
+                          <a:latin typeface="Courier New" pitchFamily="49" charset="0"/>
+                          <a:cs typeface="Courier New" pitchFamily="49" charset="0"/>
+                        </a:rPr>
+                        <a:t>0 0</a:t>
+                      </a:r>
+                    </a:p>
+                    <a:p>
+                      <a:r>
+                        <a:rPr lang="en-US" sz="900" b="0" dirty="0" smtClean="0">
+                          <a:solidFill>
+                            <a:schemeClr val="tx1"/>
+                          </a:solidFill>
+                          <a:latin typeface="Courier New" pitchFamily="49" charset="0"/>
+                          <a:cs typeface="Courier New" pitchFamily="49" charset="0"/>
+                        </a:rPr>
+                        <a:t>1 0</a:t>
+                      </a:r>
+                    </a:p>
+                    <a:p>
+                      <a:r>
+                        <a:rPr lang="en-US" sz="900" b="0" dirty="0" smtClean="0">
+                          <a:solidFill>
+                            <a:schemeClr val="tx1"/>
+                          </a:solidFill>
+                          <a:latin typeface="Courier New" pitchFamily="49" charset="0"/>
+                          <a:cs typeface="Courier New" pitchFamily="49" charset="0"/>
+                        </a:rPr>
+                        <a:t>2 0</a:t>
+                      </a:r>
+                    </a:p>
+                    <a:p>
+                      <a:r>
+                        <a:rPr lang="en-US" sz="900" b="0" dirty="0" smtClean="0">
+                          <a:solidFill>
+                            <a:schemeClr val="tx1"/>
+                          </a:solidFill>
+                          <a:latin typeface="Courier New" pitchFamily="49" charset="0"/>
+                          <a:cs typeface="Courier New" pitchFamily="49" charset="0"/>
+                        </a:rPr>
+                        <a:t>3 0</a:t>
+                      </a:r>
+                    </a:p>
+                    <a:p>
+                      <a:endParaRPr lang="en-US" sz="900" b="0" dirty="0">
+                        <a:solidFill>
+                          <a:schemeClr val="tx1"/>
+                        </a:solidFill>
+                        <a:latin typeface="Courier New" pitchFamily="49" charset="0"/>
+                        <a:cs typeface="Courier New" pitchFamily="49" charset="0"/>
+                      </a:endParaRPr>
+                    </a:p>
+                  </a:txBody>
+                  <a:tcPr>
+                    <a:solidFill>
+                      <a:schemeClr val="bg1"/>
+                    </a:solidFill>
+                  </a:tcPr>
+                </a:tc>
+                <a:tc>
+                  <a:txBody>
+                    <a:bodyPr/>
+                    <a:lstStyle/>
+                    <a:p>
+                      <a:r>
+                        <a:rPr lang="en-US" sz="900" b="0" dirty="0" smtClean="0">
+                          <a:solidFill>
+                            <a:schemeClr val="tx1"/>
+                          </a:solidFill>
+                          <a:latin typeface="Courier New" pitchFamily="49" charset="0"/>
+                          <a:cs typeface="Courier New" pitchFamily="49" charset="0"/>
+                        </a:rPr>
+                        <a:t>GPU</a:t>
+                      </a:r>
+                    </a:p>
+                    <a:p>
+                      <a:endParaRPr lang="en-US" sz="900" b="0" dirty="0" smtClean="0">
+                        <a:solidFill>
+                          <a:schemeClr val="tx1"/>
+                        </a:solidFill>
+                        <a:latin typeface="Courier New" pitchFamily="49" charset="0"/>
+                        <a:cs typeface="Courier New" pitchFamily="49" charset="0"/>
+                      </a:endParaRPr>
+                    </a:p>
+                    <a:p>
+                      <a:r>
+                        <a:rPr lang="en-US" sz="900" b="0" dirty="0" smtClean="0">
+                          <a:solidFill>
+                            <a:schemeClr val="tx1"/>
+                          </a:solidFill>
+                          <a:latin typeface="Courier New" pitchFamily="49" charset="0"/>
+                          <a:cs typeface="Courier New" pitchFamily="49" charset="0"/>
+                        </a:rPr>
+                        <a:t>2048 </a:t>
+                      </a:r>
+                      <a:r>
+                        <a:rPr lang="en-US" sz="900" b="0" dirty="0" err="1" smtClean="0">
+                          <a:solidFill>
+                            <a:schemeClr val="tx1"/>
+                          </a:solidFill>
+                          <a:latin typeface="Courier New" pitchFamily="49" charset="0"/>
+                          <a:cs typeface="Courier New" pitchFamily="49" charset="0"/>
+                        </a:rPr>
+                        <a:t>newptx</a:t>
+                      </a:r>
+                      <a:r>
+                        <a:rPr lang="en-US" sz="900" b="0" dirty="0" smtClean="0">
+                          <a:solidFill>
+                            <a:schemeClr val="tx1"/>
+                          </a:solidFill>
+                          <a:latin typeface="Courier New" pitchFamily="49" charset="0"/>
+                          <a:cs typeface="Courier New" pitchFamily="49" charset="0"/>
+                        </a:rPr>
+                        <a:t> 8</a:t>
+                      </a:r>
+                    </a:p>
+                    <a:p>
+                      <a:r>
+                        <a:rPr lang="en-US" sz="900" b="0" dirty="0" smtClean="0">
+                          <a:solidFill>
+                            <a:schemeClr val="tx1"/>
+                          </a:solidFill>
+                          <a:latin typeface="Courier New" pitchFamily="49" charset="0"/>
+                          <a:cs typeface="Courier New" pitchFamily="49" charset="0"/>
+                        </a:rPr>
+                        <a:t>0     0</a:t>
+                      </a:r>
+                    </a:p>
+                    <a:p>
+                      <a:r>
+                        <a:rPr lang="en-US" sz="900" b="0" dirty="0" smtClean="0">
+                          <a:solidFill>
+                            <a:schemeClr val="tx1"/>
+                          </a:solidFill>
+                          <a:latin typeface="Courier New" pitchFamily="49" charset="0"/>
+                          <a:cs typeface="Courier New" pitchFamily="49" charset="0"/>
+                        </a:rPr>
+                        <a:t>1     0</a:t>
+                      </a:r>
+                    </a:p>
+                    <a:p>
+                      <a:r>
+                        <a:rPr lang="en-US" sz="900" b="0" dirty="0" smtClean="0">
+                          <a:solidFill>
+                            <a:schemeClr val="tx1"/>
+                          </a:solidFill>
+                          <a:latin typeface="Courier New" pitchFamily="49" charset="0"/>
+                          <a:cs typeface="Courier New" pitchFamily="49" charset="0"/>
+                        </a:rPr>
+                        <a:t>2     0</a:t>
+                      </a:r>
+                    </a:p>
+                    <a:p>
+                      <a:r>
+                        <a:rPr lang="en-US" sz="900" b="0" dirty="0" smtClean="0">
+                          <a:solidFill>
+                            <a:schemeClr val="tx1"/>
+                          </a:solidFill>
+                          <a:latin typeface="Courier New" pitchFamily="49" charset="0"/>
+                          <a:cs typeface="Courier New" pitchFamily="49" charset="0"/>
+                        </a:rPr>
+                        <a:t>3     0</a:t>
+                      </a:r>
+                    </a:p>
+                    <a:p>
+                      <a:r>
+                        <a:rPr lang="en-US" sz="900" b="0" dirty="0" smtClean="0">
+                          <a:solidFill>
+                            <a:schemeClr val="tx1"/>
+                          </a:solidFill>
+                          <a:latin typeface="Courier New" pitchFamily="49" charset="0"/>
+                          <a:cs typeface="Courier New" pitchFamily="49" charset="0"/>
+                        </a:rPr>
+                        <a:t>65536 0</a:t>
+                      </a:r>
+                    </a:p>
+                    <a:p>
+                      <a:r>
+                        <a:rPr lang="en-US" sz="900" b="0" dirty="0" smtClean="0">
+                          <a:solidFill>
+                            <a:schemeClr val="tx1"/>
+                          </a:solidFill>
+                          <a:latin typeface="Courier New" pitchFamily="49" charset="0"/>
+                          <a:cs typeface="Courier New" pitchFamily="49" charset="0"/>
+                        </a:rPr>
+                        <a:t>65537 0</a:t>
+                      </a:r>
+                    </a:p>
+                    <a:p>
+                      <a:r>
+                        <a:rPr lang="en-US" sz="900" b="0" dirty="0" smtClean="0">
+                          <a:solidFill>
+                            <a:schemeClr val="tx1"/>
+                          </a:solidFill>
+                          <a:latin typeface="Courier New" pitchFamily="49" charset="0"/>
+                          <a:cs typeface="Courier New" pitchFamily="49" charset="0"/>
+                        </a:rPr>
+                        <a:t>…</a:t>
+                      </a:r>
+                    </a:p>
+                    <a:p>
+                      <a:endParaRPr lang="en-US" sz="900" b="0" dirty="0" smtClean="0">
+                        <a:solidFill>
+                          <a:schemeClr val="tx1"/>
+                        </a:solidFill>
+                        <a:latin typeface="Courier New" pitchFamily="49" charset="0"/>
+                        <a:cs typeface="Courier New" pitchFamily="49" charset="0"/>
+                      </a:endParaRPr>
+                    </a:p>
+                    <a:p>
+                      <a:endParaRPr lang="en-US" sz="900" b="0" dirty="0">
+                        <a:solidFill>
+                          <a:schemeClr val="tx1"/>
+                        </a:solidFill>
+                        <a:latin typeface="Courier New" pitchFamily="49" charset="0"/>
+                        <a:cs typeface="Courier New" pitchFamily="49" charset="0"/>
+                      </a:endParaRPr>
+                    </a:p>
+                  </a:txBody>
+                  <a:tcPr>
+                    <a:solidFill>
+                      <a:schemeClr val="bg1"/>
+                    </a:solidFill>
+                  </a:tcPr>
+                </a:tc>
+              </a:tr>
+            </a:tbl>
+          </a:graphicData>
+        </a:graphic>
+      </p:graphicFrame>
+      <p:cxnSp>
+        <p:nvCxnSpPr>
+          <p:cNvPr id="24" name="Elbow Connector 23"/>
+          <p:cNvCxnSpPr>
+            <a:stCxn id="15" idx="0"/>
+            <a:endCxn id="18" idx="0"/>
+          </p:cNvCxnSpPr>
+          <p:nvPr/>
+        </p:nvCxnSpPr>
+        <p:spPr>
+          <a:xfrm rot="16200000" flipV="1">
+            <a:off x="2209013" y="1033265"/>
+            <a:ext cx="6298" cy="2968967"/>
+          </a:xfrm>
+          <a:prstGeom prst="bentConnector3">
+            <a:avLst>
+              <a:gd name="adj1" fmla="val 1569832"/>
+            </a:avLst>
+          </a:prstGeom>
+          <a:ln w="3175">
+            <a:solidFill>
+              <a:schemeClr val="tx1"/>
+            </a:solidFill>
+            <a:headEnd type="none" w="med" len="med"/>
+            <a:tailEnd type="triangle" w="med" len="med"/>
+          </a:ln>
+        </p:spPr>
+        <p:style>
+          <a:lnRef idx="1">
+            <a:schemeClr val="accent1"/>
+          </a:lnRef>
+          <a:fillRef idx="0">
+            <a:schemeClr val="accent1"/>
+          </a:fillRef>
+          <a:effectRef idx="0">
+            <a:schemeClr val="accent1"/>
+          </a:effectRef>
+          <a:fontRef idx="minor">
+            <a:schemeClr val="tx1"/>
+          </a:fontRef>
+        </p:style>
+      </p:cxnSp>
+      <p:cxnSp>
+        <p:nvCxnSpPr>
+          <p:cNvPr id="60" name="Elbow Connector 59"/>
+          <p:cNvCxnSpPr>
+            <a:stCxn id="33" idx="0"/>
+            <a:endCxn id="32" idx="0"/>
+          </p:cNvCxnSpPr>
+          <p:nvPr/>
+        </p:nvCxnSpPr>
+        <p:spPr>
+          <a:xfrm rot="16200000" flipV="1">
+            <a:off x="2748553" y="1353495"/>
+            <a:ext cx="7558" cy="2342363"/>
+          </a:xfrm>
+          <a:prstGeom prst="bentConnector3">
+            <a:avLst>
+              <a:gd name="adj1" fmla="val 4324464"/>
+            </a:avLst>
+          </a:prstGeom>
+          <a:ln w="3175">
+            <a:solidFill>
+              <a:schemeClr val="tx1"/>
+            </a:solidFill>
+            <a:headEnd type="none" w="med" len="med"/>
+            <a:tailEnd type="triangle" w="med" len="med"/>
+          </a:ln>
+        </p:spPr>
+        <p:style>
+          <a:lnRef idx="1">
+            <a:schemeClr val="accent1"/>
+          </a:lnRef>
+          <a:fillRef idx="0">
+            <a:schemeClr val="accent1"/>
+          </a:fillRef>
+          <a:effectRef idx="0">
+            <a:schemeClr val="accent1"/>
+          </a:effectRef>
+          <a:fontRef idx="minor">
+            <a:schemeClr val="tx1"/>
+          </a:fontRef>
+        </p:style>
+      </p:cxnSp>
+      <p:cxnSp>
+        <p:nvCxnSpPr>
+          <p:cNvPr id="68" name="Elbow Connector 67"/>
+          <p:cNvCxnSpPr>
+            <a:stCxn id="53" idx="2"/>
+            <a:endCxn id="51" idx="2"/>
+          </p:cNvCxnSpPr>
+          <p:nvPr/>
+        </p:nvCxnSpPr>
+        <p:spPr>
+          <a:xfrm rot="5400000">
+            <a:off x="2295842" y="2011056"/>
+            <a:ext cx="6295" cy="2806961"/>
+          </a:xfrm>
+          <a:prstGeom prst="bentConnector3">
+            <a:avLst>
+              <a:gd name="adj1" fmla="val 3731454"/>
+            </a:avLst>
+          </a:prstGeom>
+          <a:ln w="3175">
+            <a:solidFill>
+              <a:schemeClr val="tx1"/>
+            </a:solidFill>
+            <a:headEnd type="none" w="med" len="med"/>
+            <a:tailEnd type="triangle" w="med" len="med"/>
+          </a:ln>
+        </p:spPr>
+        <p:style>
+          <a:lnRef idx="1">
+            <a:schemeClr val="accent1"/>
+          </a:lnRef>
+          <a:fillRef idx="0">
+            <a:schemeClr val="accent1"/>
+          </a:fillRef>
+          <a:effectRef idx="0">
+            <a:schemeClr val="accent1"/>
+          </a:effectRef>
+          <a:fontRef idx="minor">
+            <a:schemeClr val="tx1"/>
+          </a:fontRef>
+        </p:style>
+      </p:cxnSp>
+      <p:grpSp>
+        <p:nvGrpSpPr>
+          <p:cNvPr id="87" name="Group 86"/>
+          <p:cNvGrpSpPr/>
+          <p:nvPr/>
+        </p:nvGrpSpPr>
+        <p:grpSpPr>
+          <a:xfrm>
+            <a:off x="365886" y="1905000"/>
+            <a:ext cx="5441058" cy="2044874"/>
+            <a:chOff x="365886" y="1905000"/>
+            <a:chExt cx="5441058" cy="2044874"/>
+          </a:xfrm>
+        </p:grpSpPr>
+        <p:sp>
+          <p:nvSpPr>
+            <p:cNvPr id="14" name="TextBox 13"/>
+            <p:cNvSpPr txBox="1"/>
+            <p:nvPr/>
+          </p:nvSpPr>
+          <p:spPr>
+            <a:xfrm>
+              <a:off x="3435298" y="3734430"/>
+              <a:ext cx="2133600" cy="215444"/>
+            </a:xfrm>
+            <a:prstGeom prst="rect">
+              <a:avLst/>
+            </a:prstGeom>
+            <a:noFill/>
+          </p:spPr>
+          <p:txBody>
+            <a:bodyPr wrap="square" rtlCol="0">
+              <a:spAutoFit/>
+            </a:bodyPr>
+            <a:lstStyle/>
+            <a:p>
+              <a:pPr algn="ctr"/>
+              <a:r>
+                <a:rPr lang="en-US" sz="800" dirty="0" smtClean="0"/>
+                <a:t>(b) Trace.txt </a:t>
+              </a:r>
+              <a:r>
+                <a:rPr lang="en-US" sz="800" dirty="0" smtClean="0"/>
+                <a:t>Examples</a:t>
+              </a:r>
+              <a:endParaRPr lang="en-US" sz="800" dirty="0"/>
+            </a:p>
+          </p:txBody>
+        </p:sp>
+        <p:sp>
+          <p:nvSpPr>
+            <p:cNvPr id="15" name="Oval 14"/>
+            <p:cNvSpPr/>
+            <p:nvPr/>
+          </p:nvSpPr>
+          <p:spPr>
+            <a:xfrm>
+              <a:off x="3620445" y="2520898"/>
+              <a:ext cx="152400" cy="152400"/>
+            </a:xfrm>
+            <a:prstGeom prst="ellipse">
+              <a:avLst/>
+            </a:prstGeom>
+            <a:solidFill>
+              <a:schemeClr val="accent2">
+                <a:lumMod val="40000"/>
+                <a:lumOff val="60000"/>
+                <a:alpha val="53000"/>
+              </a:schemeClr>
+            </a:solidFill>
+            <a:ln>
+              <a:noFill/>
+            </a:ln>
+          </p:spPr>
+          <p:style>
+            <a:lnRef idx="2">
+              <a:schemeClr val="accent1">
+                <a:shade val="50000"/>
+              </a:schemeClr>
+            </a:lnRef>
+            <a:fillRef idx="1">
+              <a:schemeClr val="accent1"/>
+            </a:fillRef>
+            <a:effectRef idx="0">
+              <a:schemeClr val="accent1"/>
+            </a:effectRef>
+            <a:fontRef idx="minor">
+              <a:schemeClr val="lt1"/>
+            </a:fontRef>
+          </p:style>
+          <p:txBody>
+            <a:bodyPr rtlCol="0" anchor="ctr"/>
+            <a:lstStyle/>
+            <a:p>
+              <a:pPr algn="ctr"/>
+              <a:endParaRPr lang="en-US"/>
+            </a:p>
+          </p:txBody>
+        </p:sp>
+        <p:sp>
+          <p:nvSpPr>
+            <p:cNvPr id="17" name="Oval 16"/>
+            <p:cNvSpPr/>
+            <p:nvPr/>
+          </p:nvSpPr>
+          <p:spPr>
+            <a:xfrm>
+              <a:off x="4815714" y="2498227"/>
+              <a:ext cx="381000" cy="152400"/>
+            </a:xfrm>
+            <a:prstGeom prst="ellipse">
+              <a:avLst/>
+            </a:prstGeom>
+            <a:solidFill>
+              <a:schemeClr val="accent2">
+                <a:lumMod val="40000"/>
+                <a:lumOff val="60000"/>
+                <a:alpha val="53000"/>
+              </a:schemeClr>
+            </a:solidFill>
+            <a:ln>
+              <a:noFill/>
+            </a:ln>
+          </p:spPr>
+          <p:style>
+            <a:lnRef idx="2">
+              <a:schemeClr val="accent1">
+                <a:shade val="50000"/>
+              </a:schemeClr>
+            </a:lnRef>
+            <a:fillRef idx="1">
+              <a:schemeClr val="accent1"/>
+            </a:fillRef>
+            <a:effectRef idx="0">
+              <a:schemeClr val="accent1"/>
+            </a:effectRef>
+            <a:fontRef idx="minor">
+              <a:schemeClr val="lt1"/>
+            </a:fontRef>
+          </p:style>
+          <p:txBody>
+            <a:bodyPr rtlCol="0" anchor="ctr"/>
+            <a:lstStyle/>
+            <a:p>
+              <a:pPr algn="ctr"/>
+              <a:endParaRPr lang="en-US"/>
+            </a:p>
+          </p:txBody>
+        </p:sp>
+        <p:sp>
+          <p:nvSpPr>
+            <p:cNvPr id="33" name="Rectangle 32"/>
+            <p:cNvSpPr/>
+            <p:nvPr/>
+          </p:nvSpPr>
+          <p:spPr>
+            <a:xfrm>
+              <a:off x="3793312" y="2528456"/>
+              <a:ext cx="260402" cy="152400"/>
+            </a:xfrm>
+            <a:prstGeom prst="rect">
+              <a:avLst/>
+            </a:prstGeom>
+            <a:solidFill>
+              <a:schemeClr val="accent1">
+                <a:alpha val="47000"/>
+              </a:schemeClr>
+            </a:solidFill>
+            <a:ln>
+              <a:noFill/>
+            </a:ln>
+          </p:spPr>
+          <p:style>
+            <a:lnRef idx="2">
+              <a:schemeClr val="accent1">
+                <a:shade val="50000"/>
+              </a:schemeClr>
+            </a:lnRef>
+            <a:fillRef idx="1">
+              <a:schemeClr val="accent1"/>
+            </a:fillRef>
+            <a:effectRef idx="0">
+              <a:schemeClr val="accent1"/>
+            </a:effectRef>
+            <a:fontRef idx="minor">
+              <a:schemeClr val="lt1"/>
+            </a:fontRef>
+          </p:style>
+          <p:txBody>
+            <a:bodyPr rtlCol="0" anchor="ctr"/>
+            <a:lstStyle/>
+            <a:p>
+              <a:pPr algn="ctr"/>
+              <a:r>
+                <a:rPr lang="en-US" smtClean="0"/>
+                <a:t> </a:t>
+              </a:r>
+              <a:endParaRPr lang="en-US"/>
+            </a:p>
+          </p:txBody>
+        </p:sp>
+        <p:sp>
+          <p:nvSpPr>
+            <p:cNvPr id="34" name="Rectangle 33"/>
+            <p:cNvSpPr/>
+            <p:nvPr/>
+          </p:nvSpPr>
+          <p:spPr>
+            <a:xfrm>
+              <a:off x="5237648" y="2520898"/>
+              <a:ext cx="401152" cy="152400"/>
+            </a:xfrm>
+            <a:prstGeom prst="rect">
+              <a:avLst/>
+            </a:prstGeom>
+            <a:solidFill>
+              <a:schemeClr val="accent1">
+                <a:alpha val="47000"/>
+              </a:schemeClr>
+            </a:solidFill>
+            <a:ln>
+              <a:noFill/>
+            </a:ln>
+          </p:spPr>
+          <p:style>
+            <a:lnRef idx="2">
+              <a:schemeClr val="accent1">
+                <a:shade val="50000"/>
+              </a:schemeClr>
+            </a:lnRef>
+            <a:fillRef idx="1">
+              <a:schemeClr val="accent1"/>
+            </a:fillRef>
+            <a:effectRef idx="0">
+              <a:schemeClr val="accent1"/>
+            </a:effectRef>
+            <a:fontRef idx="minor">
+              <a:schemeClr val="lt1"/>
+            </a:fontRef>
+          </p:style>
+          <p:txBody>
+            <a:bodyPr rtlCol="0" anchor="ctr"/>
+            <a:lstStyle/>
+            <a:p>
+              <a:pPr algn="ctr"/>
+              <a:endParaRPr lang="en-US"/>
+            </a:p>
+          </p:txBody>
+        </p:sp>
+        <p:sp>
+          <p:nvSpPr>
+            <p:cNvPr id="53" name="Rectangle 52"/>
+            <p:cNvSpPr/>
+            <p:nvPr/>
+          </p:nvSpPr>
+          <p:spPr>
+            <a:xfrm>
+              <a:off x="3609108" y="2682117"/>
+              <a:ext cx="186721" cy="729272"/>
+            </a:xfrm>
+            <a:prstGeom prst="rect">
+              <a:avLst/>
+            </a:prstGeom>
+            <a:solidFill>
+              <a:schemeClr val="bg2">
+                <a:lumMod val="75000"/>
+                <a:alpha val="58000"/>
+              </a:schemeClr>
+            </a:solidFill>
+            <a:ln>
+              <a:noFill/>
+            </a:ln>
+          </p:spPr>
+          <p:style>
+            <a:lnRef idx="2">
+              <a:schemeClr val="accent1">
+                <a:shade val="50000"/>
+              </a:schemeClr>
+            </a:lnRef>
+            <a:fillRef idx="1">
+              <a:schemeClr val="accent1"/>
+            </a:fillRef>
+            <a:effectRef idx="0">
+              <a:schemeClr val="accent1"/>
+            </a:effectRef>
+            <a:fontRef idx="minor">
+              <a:schemeClr val="lt1"/>
+            </a:fontRef>
+          </p:style>
+          <p:txBody>
+            <a:bodyPr rtlCol="0" anchor="ctr"/>
+            <a:lstStyle/>
+            <a:p>
+              <a:pPr algn="ctr"/>
+              <a:endParaRPr lang="en-US"/>
+            </a:p>
+          </p:txBody>
+        </p:sp>
+        <p:sp>
+          <p:nvSpPr>
+            <p:cNvPr id="54" name="Rectangle 53"/>
+            <p:cNvSpPr/>
+            <p:nvPr/>
+          </p:nvSpPr>
+          <p:spPr>
+            <a:xfrm>
+              <a:off x="4827835" y="2682117"/>
+              <a:ext cx="439411" cy="831900"/>
+            </a:xfrm>
+            <a:prstGeom prst="rect">
+              <a:avLst/>
+            </a:prstGeom>
+            <a:solidFill>
+              <a:schemeClr val="bg2">
+                <a:lumMod val="75000"/>
+                <a:alpha val="58000"/>
+              </a:schemeClr>
+            </a:solidFill>
+            <a:ln>
+              <a:noFill/>
+            </a:ln>
+          </p:spPr>
+          <p:style>
+            <a:lnRef idx="2">
+              <a:schemeClr val="accent1">
+                <a:shade val="50000"/>
+              </a:schemeClr>
+            </a:lnRef>
+            <a:fillRef idx="1">
+              <a:schemeClr val="accent1"/>
+            </a:fillRef>
+            <a:effectRef idx="0">
+              <a:schemeClr val="accent1"/>
+            </a:effectRef>
+            <a:fontRef idx="minor">
+              <a:schemeClr val="lt1"/>
+            </a:fontRef>
+          </p:style>
+          <p:txBody>
+            <a:bodyPr rtlCol="0" anchor="ctr"/>
+            <a:lstStyle/>
+            <a:p>
+              <a:pPr algn="ctr"/>
+              <a:endParaRPr lang="en-US"/>
+            </a:p>
+          </p:txBody>
+        </p:sp>
+        <p:grpSp>
+          <p:nvGrpSpPr>
+            <p:cNvPr id="85" name="Group 84"/>
+            <p:cNvGrpSpPr/>
+            <p:nvPr/>
+          </p:nvGrpSpPr>
+          <p:grpSpPr>
+            <a:xfrm>
+              <a:off x="365886" y="1905000"/>
+              <a:ext cx="3139314" cy="2044874"/>
+              <a:chOff x="365886" y="1905000"/>
+              <a:chExt cx="3139314" cy="2044874"/>
+            </a:xfrm>
+          </p:grpSpPr>
+          <p:sp>
+            <p:nvSpPr>
+              <p:cNvPr id="8" name="TextBox 7"/>
+              <p:cNvSpPr txBox="1"/>
+              <p:nvPr/>
+            </p:nvSpPr>
+            <p:spPr>
+              <a:xfrm>
+                <a:off x="381000" y="2209800"/>
+                <a:ext cx="3124200" cy="1200329"/>
+              </a:xfrm>
+              <a:prstGeom prst="rect">
+                <a:avLst/>
+              </a:prstGeom>
+              <a:noFill/>
+              <a:ln>
+                <a:noFill/>
+              </a:ln>
+            </p:spPr>
+            <p:txBody>
+              <a:bodyPr wrap="square" rtlCol="0">
+                <a:spAutoFit/>
+              </a:bodyPr>
+              <a:lstStyle/>
+              <a:p>
+                <a:endParaRPr lang="en-US" sz="900" dirty="0" smtClean="0">
+                  <a:latin typeface="Courier New" pitchFamily="49" charset="0"/>
+                  <a:cs typeface="Courier New" pitchFamily="49" charset="0"/>
+                </a:endParaRPr>
+              </a:p>
+              <a:p>
+                <a:endParaRPr lang="en-US" sz="900" dirty="0" smtClean="0">
+                  <a:latin typeface="Courier New" pitchFamily="49" charset="0"/>
+                  <a:cs typeface="Courier New" pitchFamily="49" charset="0"/>
+                </a:endParaRPr>
+              </a:p>
+              <a:p>
+                <a:r>
+                  <a:rPr lang="en-US" sz="900" dirty="0" smtClean="0">
+                    <a:latin typeface="Courier New" pitchFamily="49" charset="0"/>
+                    <a:cs typeface="Courier New" pitchFamily="49" charset="0"/>
+                  </a:rPr>
+                  <a:t>#Threads | Trace Type | (Optional Fields) </a:t>
+                </a:r>
+              </a:p>
+              <a:p>
+                <a:r>
+                  <a:rPr lang="en-US" sz="900" dirty="0" smtClean="0">
+                    <a:latin typeface="Courier New" pitchFamily="49" charset="0"/>
+                    <a:cs typeface="Courier New" pitchFamily="49" charset="0"/>
+                  </a:rPr>
+                  <a:t>1st thread ID  | Start Instruction No.</a:t>
+                </a:r>
+              </a:p>
+              <a:p>
+                <a:r>
+                  <a:rPr lang="en-US" sz="900" dirty="0" smtClean="0">
+                    <a:latin typeface="Courier New" pitchFamily="49" charset="0"/>
+                    <a:cs typeface="Courier New" pitchFamily="49" charset="0"/>
+                  </a:rPr>
+                  <a:t>2nd thread ID  | Start Instruction No.</a:t>
+                </a:r>
+              </a:p>
+              <a:p>
+                <a:r>
+                  <a:rPr lang="en-US" sz="900" dirty="0" smtClean="0">
+                    <a:latin typeface="Courier New" pitchFamily="49" charset="0"/>
+                    <a:cs typeface="Courier New" pitchFamily="49" charset="0"/>
+                  </a:rPr>
+                  <a:t>3rd thread ID  | Start Instruction No.</a:t>
+                </a:r>
+              </a:p>
+              <a:p>
+                <a:r>
+                  <a:rPr lang="en-US" sz="900" dirty="0" smtClean="0">
+                    <a:latin typeface="Courier New" pitchFamily="49" charset="0"/>
+                    <a:cs typeface="Courier New" pitchFamily="49" charset="0"/>
+                  </a:rPr>
+                  <a:t>..</a:t>
+                </a:r>
+              </a:p>
+              <a:p>
+                <a:r>
+                  <a:rPr lang="en-US" sz="900" dirty="0" smtClean="0">
+                    <a:latin typeface="Courier New" pitchFamily="49" charset="0"/>
+                    <a:cs typeface="Courier New" pitchFamily="49" charset="0"/>
+                  </a:rPr>
+                  <a:t>Nth thread ID  | Start Instruction No.</a:t>
+                </a:r>
+              </a:p>
+            </p:txBody>
+          </p:sp>
+          <p:cxnSp>
+            <p:nvCxnSpPr>
+              <p:cNvPr id="12" name="Straight Connector 11"/>
+              <p:cNvCxnSpPr/>
+              <p:nvPr/>
+            </p:nvCxnSpPr>
+            <p:spPr>
+              <a:xfrm>
+                <a:off x="3429000" y="1905000"/>
+                <a:ext cx="0" cy="2044874"/>
+              </a:xfrm>
+              <a:prstGeom prst="line">
+                <a:avLst/>
+              </a:prstGeom>
+              <a:ln w="3175">
+                <a:prstDash val="dash"/>
+              </a:ln>
+            </p:spPr>
+            <p:style>
+              <a:lnRef idx="1">
+                <a:schemeClr val="dk1"/>
+              </a:lnRef>
+              <a:fillRef idx="0">
+                <a:schemeClr val="dk1"/>
+              </a:fillRef>
+              <a:effectRef idx="0">
+                <a:schemeClr val="dk1"/>
+              </a:effectRef>
+              <a:fontRef idx="minor">
+                <a:schemeClr val="tx1"/>
+              </a:fontRef>
+            </p:style>
+          </p:cxnSp>
+          <p:sp>
+            <p:nvSpPr>
+              <p:cNvPr id="13" name="TextBox 12"/>
+              <p:cNvSpPr txBox="1"/>
+              <p:nvPr/>
+            </p:nvSpPr>
+            <p:spPr>
+              <a:xfrm>
+                <a:off x="838200" y="3733800"/>
+                <a:ext cx="1905000" cy="215444"/>
+              </a:xfrm>
+              <a:prstGeom prst="rect">
+                <a:avLst/>
+              </a:prstGeom>
+              <a:noFill/>
+            </p:spPr>
+            <p:txBody>
+              <a:bodyPr wrap="square" rtlCol="0">
+                <a:spAutoFit/>
+              </a:bodyPr>
+              <a:lstStyle/>
+              <a:p>
+                <a:pPr algn="ctr"/>
+                <a:r>
+                  <a:rPr lang="en-US" sz="800" dirty="0" smtClean="0"/>
+                  <a:t>(a) Trace.txt </a:t>
+                </a:r>
+                <a:r>
+                  <a:rPr lang="en-US" sz="800" dirty="0" smtClean="0"/>
+                  <a:t>Format</a:t>
+                </a:r>
+                <a:endParaRPr lang="en-US" sz="800" dirty="0"/>
+              </a:p>
+            </p:txBody>
+          </p:sp>
+          <p:sp>
+            <p:nvSpPr>
+              <p:cNvPr id="18" name="Oval 17"/>
+              <p:cNvSpPr/>
+              <p:nvPr/>
+            </p:nvSpPr>
+            <p:spPr>
+              <a:xfrm>
+                <a:off x="388556" y="2514600"/>
+                <a:ext cx="678243" cy="152400"/>
+              </a:xfrm>
+              <a:prstGeom prst="ellipse">
+                <a:avLst/>
+              </a:prstGeom>
+              <a:solidFill>
+                <a:schemeClr val="accent2">
+                  <a:lumMod val="40000"/>
+                  <a:lumOff val="60000"/>
+                  <a:alpha val="53000"/>
+                </a:schemeClr>
+              </a:solidFill>
+              <a:ln>
+                <a:noFill/>
+              </a:ln>
+            </p:spPr>
+            <p:style>
+              <a:lnRef idx="2">
+                <a:schemeClr val="accent1">
+                  <a:shade val="50000"/>
+                </a:schemeClr>
+              </a:lnRef>
+              <a:fillRef idx="1">
+                <a:schemeClr val="accent1"/>
+              </a:fillRef>
+              <a:effectRef idx="0">
+                <a:schemeClr val="accent1"/>
+              </a:effectRef>
+              <a:fontRef idx="minor">
+                <a:schemeClr val="lt1"/>
+              </a:fontRef>
+            </p:style>
+            <p:txBody>
+              <a:bodyPr rtlCol="0" anchor="ctr"/>
+              <a:lstStyle/>
+              <a:p>
+                <a:pPr algn="ctr"/>
+                <a:endParaRPr lang="en-US"/>
+              </a:p>
+            </p:txBody>
+          </p:sp>
+          <p:sp>
+            <p:nvSpPr>
+              <p:cNvPr id="32" name="Rectangle 31"/>
+              <p:cNvSpPr/>
+              <p:nvPr/>
+            </p:nvSpPr>
+            <p:spPr>
+              <a:xfrm>
+                <a:off x="1219200" y="2520898"/>
+                <a:ext cx="723900" cy="146102"/>
+              </a:xfrm>
+              <a:prstGeom prst="rect">
+                <a:avLst/>
+              </a:prstGeom>
+              <a:solidFill>
+                <a:schemeClr val="accent1">
+                  <a:alpha val="47000"/>
+                </a:schemeClr>
+              </a:solidFill>
+              <a:ln>
+                <a:noFill/>
+              </a:ln>
+            </p:spPr>
+            <p:style>
+              <a:lnRef idx="2">
+                <a:schemeClr val="accent1">
+                  <a:shade val="50000"/>
+                </a:schemeClr>
+              </a:lnRef>
+              <a:fillRef idx="1">
+                <a:schemeClr val="accent1"/>
+              </a:fillRef>
+              <a:effectRef idx="0">
+                <a:schemeClr val="accent1"/>
+              </a:effectRef>
+              <a:fontRef idx="minor">
+                <a:schemeClr val="lt1"/>
+              </a:fontRef>
+            </p:style>
+            <p:txBody>
+              <a:bodyPr rtlCol="0" anchor="ctr"/>
+              <a:lstStyle/>
+              <a:p>
+                <a:pPr algn="ctr"/>
+                <a:endParaRPr lang="en-US"/>
+              </a:p>
+            </p:txBody>
+          </p:sp>
+          <p:sp>
+            <p:nvSpPr>
+              <p:cNvPr id="51" name="Rectangle 50"/>
+              <p:cNvSpPr/>
+              <p:nvPr/>
+            </p:nvSpPr>
+            <p:spPr>
+              <a:xfrm>
+                <a:off x="365886" y="2688412"/>
+                <a:ext cx="1059244" cy="729272"/>
+              </a:xfrm>
+              <a:prstGeom prst="rect">
+                <a:avLst/>
+              </a:prstGeom>
+              <a:solidFill>
+                <a:schemeClr val="bg2">
+                  <a:lumMod val="75000"/>
+                  <a:alpha val="58000"/>
+                </a:schemeClr>
+              </a:solidFill>
+              <a:ln>
+                <a:noFill/>
+              </a:ln>
+            </p:spPr>
+            <p:style>
+              <a:lnRef idx="2">
+                <a:schemeClr val="accent1">
+                  <a:shade val="50000"/>
+                </a:schemeClr>
+              </a:lnRef>
+              <a:fillRef idx="1">
+                <a:schemeClr val="accent1"/>
+              </a:fillRef>
+              <a:effectRef idx="0">
+                <a:schemeClr val="accent1"/>
+              </a:effectRef>
+              <a:fontRef idx="minor">
+                <a:schemeClr val="lt1"/>
+              </a:fontRef>
+            </p:style>
+            <p:txBody>
+              <a:bodyPr rtlCol="0" anchor="ctr"/>
+              <a:lstStyle/>
+              <a:p>
+                <a:pPr algn="ctr"/>
+                <a:endParaRPr lang="en-US"/>
+              </a:p>
+            </p:txBody>
+          </p:sp>
+          <p:sp>
+            <p:nvSpPr>
+              <p:cNvPr id="76" name="Rectangle 75"/>
+              <p:cNvSpPr/>
+              <p:nvPr/>
+            </p:nvSpPr>
+            <p:spPr>
+              <a:xfrm>
+                <a:off x="2133600" y="2524676"/>
+                <a:ext cx="1143000" cy="142324"/>
+              </a:xfrm>
+              <a:prstGeom prst="rect">
+                <a:avLst/>
+              </a:prstGeom>
+              <a:solidFill>
+                <a:schemeClr val="accent3">
+                  <a:lumMod val="40000"/>
+                  <a:lumOff val="60000"/>
+                  <a:alpha val="65000"/>
+                </a:schemeClr>
+              </a:solidFill>
+              <a:ln>
+                <a:noFill/>
+              </a:ln>
+            </p:spPr>
+            <p:style>
+              <a:lnRef idx="2">
+                <a:schemeClr val="accent1">
+                  <a:shade val="50000"/>
+                </a:schemeClr>
+              </a:lnRef>
+              <a:fillRef idx="1">
+                <a:schemeClr val="accent1"/>
+              </a:fillRef>
+              <a:effectRef idx="0">
+                <a:schemeClr val="accent1"/>
+              </a:effectRef>
+              <a:fontRef idx="minor">
+                <a:schemeClr val="lt1"/>
+              </a:fontRef>
+            </p:style>
+            <p:txBody>
+              <a:bodyPr rtlCol="0" anchor="ctr"/>
+              <a:lstStyle/>
+              <a:p>
+                <a:pPr algn="ctr"/>
+                <a:endParaRPr lang="en-US"/>
+              </a:p>
+            </p:txBody>
+          </p:sp>
+        </p:grpSp>
+        <p:sp>
+          <p:nvSpPr>
+            <p:cNvPr id="77" name="Rectangle 76"/>
+            <p:cNvSpPr/>
+            <p:nvPr/>
+          </p:nvSpPr>
+          <p:spPr>
+            <a:xfrm>
+              <a:off x="5692644" y="2525936"/>
+              <a:ext cx="114300" cy="133506"/>
+            </a:xfrm>
+            <a:prstGeom prst="rect">
+              <a:avLst/>
+            </a:prstGeom>
+            <a:solidFill>
+              <a:schemeClr val="accent3">
+                <a:lumMod val="40000"/>
+                <a:lumOff val="60000"/>
+                <a:alpha val="65000"/>
+              </a:schemeClr>
+            </a:solidFill>
+            <a:ln>
+              <a:noFill/>
+            </a:ln>
+          </p:spPr>
+          <p:style>
+            <a:lnRef idx="2">
+              <a:schemeClr val="accent1">
+                <a:shade val="50000"/>
+              </a:schemeClr>
+            </a:lnRef>
+            <a:fillRef idx="1">
+              <a:schemeClr val="accent1"/>
+            </a:fillRef>
+            <a:effectRef idx="0">
+              <a:schemeClr val="accent1"/>
+            </a:effectRef>
+            <a:fontRef idx="minor">
+              <a:schemeClr val="lt1"/>
+            </a:fontRef>
+          </p:style>
+          <p:txBody>
+            <a:bodyPr rtlCol="0" anchor="ctr"/>
+            <a:lstStyle/>
+            <a:p>
+              <a:pPr algn="ctr"/>
+              <a:endParaRPr lang="en-US"/>
+            </a:p>
+          </p:txBody>
+        </p:sp>
+        <p:cxnSp>
+          <p:nvCxnSpPr>
+            <p:cNvPr id="79" name="Elbow Connector 78"/>
+            <p:cNvCxnSpPr>
+              <a:stCxn id="77" idx="0"/>
+              <a:endCxn id="76" idx="0"/>
+            </p:cNvCxnSpPr>
+            <p:nvPr/>
+          </p:nvCxnSpPr>
+          <p:spPr>
+            <a:xfrm rot="16200000" flipV="1">
+              <a:off x="4226817" y="1002959"/>
+              <a:ext cx="1260" cy="3044694"/>
+            </a:xfrm>
+            <a:prstGeom prst="bentConnector3">
+              <a:avLst>
+                <a:gd name="adj1" fmla="val 35635952"/>
+              </a:avLst>
+            </a:prstGeom>
+            <a:ln w="3175">
+              <a:solidFill>
+                <a:schemeClr val="tx1"/>
+              </a:solidFill>
+              <a:headEnd type="none" w="med" len="med"/>
+              <a:tailEnd type="triangle" w="med" len="med"/>
+            </a:ln>
+          </p:spPr>
+          <p:style>
+            <a:lnRef idx="1">
+              <a:schemeClr val="accent1"/>
+            </a:lnRef>
+            <a:fillRef idx="0">
+              <a:schemeClr val="accent1"/>
+            </a:fillRef>
+            <a:effectRef idx="0">
+              <a:schemeClr val="accent1"/>
+            </a:effectRef>
+            <a:fontRef idx="minor">
+              <a:schemeClr val="tx1"/>
+            </a:fontRef>
+          </p:style>
+        </p:cxnSp>
+      </p:grpSp>
       <p:sp>
         <p:nvSpPr>
-          <p:cNvPr id="2" name="Title 1"/>
-          <p:cNvSpPr>
-            <a:spLocks noGrp="1"/>
-          </p:cNvSpPr>
-          <p:nvPr>
-            <p:ph type="title"/>
-          </p:nvPr>
+          <p:cNvPr id="4" name="Left Brace 3"/>
+          <p:cNvSpPr/>
+          <p:nvPr/>
         </p:nvSpPr>
-        <p:spPr/>
+        <p:spPr>
+          <a:xfrm>
+            <a:off x="4648201" y="2743200"/>
+            <a:ext cx="121918" cy="381000"/>
+          </a:xfrm>
+          <a:prstGeom prst="leftBrace">
+            <a:avLst/>
+          </a:prstGeom>
+          <a:ln w="3175">
+            <a:solidFill>
+              <a:schemeClr val="tx1"/>
+            </a:solidFill>
+          </a:ln>
+        </p:spPr>
+        <p:style>
+          <a:lnRef idx="1">
+            <a:schemeClr val="accent1"/>
+          </a:lnRef>
+          <a:fillRef idx="0">
+            <a:schemeClr val="accent1"/>
+          </a:fillRef>
+          <a:effectRef idx="0">
+            <a:schemeClr val="accent1"/>
+          </a:effectRef>
+          <a:fontRef idx="minor">
+            <a:schemeClr val="tx1"/>
+          </a:fontRef>
+        </p:style>
         <p:txBody>
-          <a:bodyPr/>
+          <a:bodyPr rtlCol="0" anchor="ctr"/>
           <a:lstStyle/>
           <a:p>
+            <a:pPr algn="ctr"/>
             <a:endParaRPr lang="en-US"/>
           </a:p>
         </p:txBody>
       </p:sp>
       <p:sp>
         <p:nvSpPr>
-          <p:cNvPr id="3" name="Content Placeholder 2"/>
-          <p:cNvSpPr>
-            <a:spLocks noGrp="1"/>
-          </p:cNvSpPr>
-          <p:nvPr>
-            <p:ph idx="1"/>
-          </p:nvPr>
+          <p:cNvPr id="27" name="Left Brace 26"/>
+          <p:cNvSpPr/>
+          <p:nvPr/>
         </p:nvSpPr>
-        <p:spPr/>
+        <p:spPr>
+          <a:xfrm>
+            <a:off x="4648199" y="3240251"/>
+            <a:ext cx="121919" cy="354867"/>
+          </a:xfrm>
+          <a:prstGeom prst="leftBrace">
+            <a:avLst/>
+          </a:prstGeom>
+          <a:ln w="3175">
+            <a:solidFill>
+              <a:schemeClr val="tx1"/>
+            </a:solidFill>
+          </a:ln>
+        </p:spPr>
+        <p:style>
+          <a:lnRef idx="1">
+            <a:schemeClr val="accent1"/>
+          </a:lnRef>
+          <a:fillRef idx="0">
+            <a:schemeClr val="accent1"/>
+          </a:fillRef>
+          <a:effectRef idx="0">
+            <a:schemeClr val="accent1"/>
+          </a:effectRef>
+          <a:fontRef idx="minor">
+            <a:schemeClr val="tx1"/>
+          </a:fontRef>
+        </p:style>
         <p:txBody>
-          <a:bodyPr/>
+          <a:bodyPr rtlCol="0" anchor="ctr"/>
           <a:lstStyle/>
           <a:p>
+            <a:pPr algn="ctr"/>
             <a:endParaRPr lang="en-US"/>
+          </a:p>
+        </p:txBody>
+      </p:sp>
+      <p:sp>
+        <p:nvSpPr>
+          <p:cNvPr id="5" name="TextBox 4"/>
+          <p:cNvSpPr txBox="1"/>
+          <p:nvPr/>
+        </p:nvSpPr>
+        <p:spPr>
+          <a:xfrm>
+            <a:off x="4166127" y="2809964"/>
+            <a:ext cx="563338" cy="307777"/>
+          </a:xfrm>
+          <a:prstGeom prst="rect">
+            <a:avLst/>
+          </a:prstGeom>
+          <a:noFill/>
+        </p:spPr>
+        <p:txBody>
+          <a:bodyPr wrap="square" rtlCol="0">
+            <a:spAutoFit/>
+          </a:bodyPr>
+          <a:lstStyle/>
+          <a:p>
+            <a:r>
+              <a:rPr lang="en-US" sz="700" dirty="0" smtClean="0">
+                <a:latin typeface="Courier New" pitchFamily="49" charset="0"/>
+                <a:cs typeface="Courier New" pitchFamily="49" charset="0"/>
+              </a:rPr>
+              <a:t>Thread</a:t>
+            </a:r>
+          </a:p>
+          <a:p>
+            <a:r>
+              <a:rPr lang="en-US" sz="700" dirty="0" smtClean="0">
+                <a:latin typeface="Courier New" pitchFamily="49" charset="0"/>
+                <a:cs typeface="Courier New" pitchFamily="49" charset="0"/>
+              </a:rPr>
+              <a:t>Block 0</a:t>
+            </a:r>
+            <a:endParaRPr lang="en-US" sz="700" dirty="0">
+              <a:latin typeface="Courier New" pitchFamily="49" charset="0"/>
+              <a:cs typeface="Courier New" pitchFamily="49" charset="0"/>
+            </a:endParaRPr>
+          </a:p>
+        </p:txBody>
+      </p:sp>
+      <p:sp>
+        <p:nvSpPr>
+          <p:cNvPr id="29" name="TextBox 28"/>
+          <p:cNvSpPr txBox="1"/>
+          <p:nvPr/>
+        </p:nvSpPr>
+        <p:spPr>
+          <a:xfrm>
+            <a:off x="4166127" y="3263796"/>
+            <a:ext cx="661708" cy="307777"/>
+          </a:xfrm>
+          <a:prstGeom prst="rect">
+            <a:avLst/>
+          </a:prstGeom>
+          <a:noFill/>
+        </p:spPr>
+        <p:txBody>
+          <a:bodyPr wrap="square" rtlCol="0">
+            <a:spAutoFit/>
+          </a:bodyPr>
+          <a:lstStyle/>
+          <a:p>
+            <a:r>
+              <a:rPr lang="en-US" sz="700" dirty="0" smtClean="0">
+                <a:latin typeface="Courier New" pitchFamily="49" charset="0"/>
+                <a:cs typeface="Courier New" pitchFamily="49" charset="0"/>
+              </a:rPr>
+              <a:t>Thread Block 1</a:t>
+            </a:r>
+            <a:endParaRPr lang="en-US" sz="700" dirty="0">
+              <a:latin typeface="Courier New" pitchFamily="49" charset="0"/>
+              <a:cs typeface="Courier New" pitchFamily="49" charset="0"/>
+            </a:endParaRPr>
           </a:p>
         </p:txBody>
       </p:sp>
@@ -16347,6 +17722,13 @@
   <p:clrMapOvr>
     <a:masterClrMapping/>
   </p:clrMapOvr>
+  <p:timing>
+    <p:tnLst>
+      <p:par>
+        <p:cTn id="1" dur="indefinite" restart="never" nodeType="tmRoot"/>
+      </p:par>
+    </p:tnLst>
+  </p:timing>
 </p:sld>
 </file>
 

</xml_diff>

<commit_message>
update trace format and STAT information
git-svn-id: https://svn.research.cc.gatech.edu/macsim/trunk@655 76505255-db3a-46bb-8524-017587b0c4bf
</commit_message>
<xml_diff>
--- a/doc/latex/figs/fig.pptx
+++ b/doc/latex/figs/fig.pptx
@@ -12,6 +12,7 @@
     <p:sldId id="261" r:id="rId6"/>
     <p:sldId id="262" r:id="rId7"/>
     <p:sldId id="260" r:id="rId8"/>
+    <p:sldId id="263" r:id="rId9"/>
   </p:sldIdLst>
   <p:sldSz cx="9144000" cy="6858000" type="screen4x3"/>
   <p:notesSz cx="6858000" cy="9144000"/>
@@ -294,7 +295,7 @@
           <a:p>
             <a:fld id="{8415CA18-29E3-446E-9C3A-1247C8AC240A}" type="datetimeFigureOut">
               <a:rPr lang="en-US" smtClean="0"/>
-              <a:t>12/9/2011</a:t>
+              <a:t>9/8/15</a:t>
             </a:fld>
             <a:endParaRPr lang="en-US"/>
           </a:p>
@@ -464,7 +465,7 @@
           <a:p>
             <a:fld id="{8415CA18-29E3-446E-9C3A-1247C8AC240A}" type="datetimeFigureOut">
               <a:rPr lang="en-US" smtClean="0"/>
-              <a:t>12/9/2011</a:t>
+              <a:t>9/8/15</a:t>
             </a:fld>
             <a:endParaRPr lang="en-US"/>
           </a:p>
@@ -644,7 +645,7 @@
           <a:p>
             <a:fld id="{8415CA18-29E3-446E-9C3A-1247C8AC240A}" type="datetimeFigureOut">
               <a:rPr lang="en-US" smtClean="0"/>
-              <a:t>12/9/2011</a:t>
+              <a:t>9/8/15</a:t>
             </a:fld>
             <a:endParaRPr lang="en-US"/>
           </a:p>
@@ -814,7 +815,7 @@
           <a:p>
             <a:fld id="{8415CA18-29E3-446E-9C3A-1247C8AC240A}" type="datetimeFigureOut">
               <a:rPr lang="en-US" smtClean="0"/>
-              <a:t>12/9/2011</a:t>
+              <a:t>9/8/15</a:t>
             </a:fld>
             <a:endParaRPr lang="en-US"/>
           </a:p>
@@ -1060,7 +1061,7 @@
           <a:p>
             <a:fld id="{8415CA18-29E3-446E-9C3A-1247C8AC240A}" type="datetimeFigureOut">
               <a:rPr lang="en-US" smtClean="0"/>
-              <a:t>12/9/2011</a:t>
+              <a:t>9/8/15</a:t>
             </a:fld>
             <a:endParaRPr lang="en-US"/>
           </a:p>
@@ -1348,7 +1349,7 @@
           <a:p>
             <a:fld id="{8415CA18-29E3-446E-9C3A-1247C8AC240A}" type="datetimeFigureOut">
               <a:rPr lang="en-US" smtClean="0"/>
-              <a:t>12/9/2011</a:t>
+              <a:t>9/8/15</a:t>
             </a:fld>
             <a:endParaRPr lang="en-US"/>
           </a:p>
@@ -1770,7 +1771,7 @@
           <a:p>
             <a:fld id="{8415CA18-29E3-446E-9C3A-1247C8AC240A}" type="datetimeFigureOut">
               <a:rPr lang="en-US" smtClean="0"/>
-              <a:t>12/9/2011</a:t>
+              <a:t>9/8/15</a:t>
             </a:fld>
             <a:endParaRPr lang="en-US"/>
           </a:p>
@@ -1888,7 +1889,7 @@
           <a:p>
             <a:fld id="{8415CA18-29E3-446E-9C3A-1247C8AC240A}" type="datetimeFigureOut">
               <a:rPr lang="en-US" smtClean="0"/>
-              <a:t>12/9/2011</a:t>
+              <a:t>9/8/15</a:t>
             </a:fld>
             <a:endParaRPr lang="en-US"/>
           </a:p>
@@ -1983,7 +1984,7 @@
           <a:p>
             <a:fld id="{8415CA18-29E3-446E-9C3A-1247C8AC240A}" type="datetimeFigureOut">
               <a:rPr lang="en-US" smtClean="0"/>
-              <a:t>12/9/2011</a:t>
+              <a:t>9/8/15</a:t>
             </a:fld>
             <a:endParaRPr lang="en-US"/>
           </a:p>
@@ -2260,7 +2261,7 @@
           <a:p>
             <a:fld id="{8415CA18-29E3-446E-9C3A-1247C8AC240A}" type="datetimeFigureOut">
               <a:rPr lang="en-US" smtClean="0"/>
-              <a:t>12/9/2011</a:t>
+              <a:t>9/8/15</a:t>
             </a:fld>
             <a:endParaRPr lang="en-US"/>
           </a:p>
@@ -2513,7 +2514,7 @@
           <a:p>
             <a:fld id="{8415CA18-29E3-446E-9C3A-1247C8AC240A}" type="datetimeFigureOut">
               <a:rPr lang="en-US" smtClean="0"/>
-              <a:t>12/9/2011</a:t>
+              <a:t>9/8/15</a:t>
             </a:fld>
             <a:endParaRPr lang="en-US"/>
           </a:p>
@@ -2726,7 +2727,7 @@
           <a:p>
             <a:fld id="{8415CA18-29E3-446E-9C3A-1247C8AC240A}" type="datetimeFigureOut">
               <a:rPr lang="en-US" smtClean="0"/>
-              <a:t>12/9/2011</a:t>
+              <a:t>9/8/15</a:t>
             </a:fld>
             <a:endParaRPr lang="en-US"/>
           </a:p>
@@ -3152,7 +3153,7 @@
   <p:timing>
     <p:tnLst>
       <p:par>
-        <p:cTn id="1" dur="indefinite" restart="never" nodeType="tmRoot"/>
+        <p:cTn xmlns:p14="http://schemas.microsoft.com/office/powerpoint/2010/main" id="1" dur="indefinite" restart="never" nodeType="tmRoot"/>
       </p:par>
     </p:tnLst>
   </p:timing>
@@ -3756,7 +3757,7 @@
   <p:timing>
     <p:tnLst>
       <p:par>
-        <p:cTn id="1" dur="indefinite" restart="never" nodeType="tmRoot">
+        <p:cTn xmlns:p14="http://schemas.microsoft.com/office/powerpoint/2010/main" id="1" dur="indefinite" restart="never" nodeType="tmRoot">
           <p:childTnLst>
             <p:seq concurrent="1" nextAc="seek">
               <p:cTn id="2" dur="indefinite" nodeType="mainSeq">
@@ -9519,7 +9520,7 @@
   <p:timing>
     <p:tnLst>
       <p:par>
-        <p:cTn id="1" dur="indefinite" restart="never" nodeType="tmRoot">
+        <p:cTn xmlns:p14="http://schemas.microsoft.com/office/powerpoint/2010/main" id="1" dur="indefinite" restart="never" nodeType="tmRoot">
           <p:childTnLst>
             <p:seq concurrent="1" nextAc="seek">
               <p:cTn id="2" dur="indefinite" nodeType="mainSeq">
@@ -14914,7 +14915,7 @@
   <p:timing>
     <p:tnLst>
       <p:par>
-        <p:cTn id="1" dur="indefinite" restart="never" nodeType="tmRoot">
+        <p:cTn xmlns:p14="http://schemas.microsoft.com/office/powerpoint/2010/main" id="1" dur="indefinite" restart="never" nodeType="tmRoot">
           <p:childTnLst>
             <p:seq concurrent="1" nextAc="seek">
               <p:cTn id="2" dur="indefinite" nodeType="mainSeq">
@@ -16282,7 +16283,7 @@
   <p:timing>
     <p:tnLst>
       <p:par>
-        <p:cTn id="1" dur="indefinite" restart="never" nodeType="tmRoot"/>
+        <p:cTn xmlns:p14="http://schemas.microsoft.com/office/powerpoint/2010/main" id="1" dur="indefinite" restart="never" nodeType="tmRoot"/>
       </p:par>
     </p:tnLst>
   </p:timing>
@@ -16772,11 +16773,7 @@
               <a:pPr algn="ctr"/>
               <a:r>
                 <a:rPr lang="en-US" sz="800" dirty="0" smtClean="0"/>
-                <a:t>(b) Trace.txt </a:t>
-              </a:r>
-              <a:r>
-                <a:rPr lang="en-US" sz="800" dirty="0" smtClean="0"/>
-                <a:t>Examples</a:t>
+                <a:t>(b) Trace.txt Examples</a:t>
               </a:r>
               <a:endParaRPr lang="en-US" sz="800" dirty="0"/>
             </a:p>
@@ -17244,11 +17241,7 @@
                 <a:pPr algn="ctr"/>
                 <a:r>
                   <a:rPr lang="en-US" sz="800" dirty="0" smtClean="0"/>
-                  <a:t>(a) Trace.txt </a:t>
-                </a:r>
-                <a:r>
-                  <a:rPr lang="en-US" sz="800" dirty="0" smtClean="0"/>
-                  <a:t>Format</a:t>
+                  <a:t>(a) Trace.txt Format</a:t>
                 </a:r>
                 <a:endParaRPr lang="en-US" sz="800" dirty="0"/>
               </a:p>
@@ -17725,7 +17718,1316 @@
   <p:timing>
     <p:tnLst>
       <p:par>
-        <p:cTn id="1" dur="indefinite" restart="never" nodeType="tmRoot"/>
+        <p:cTn xmlns:p14="http://schemas.microsoft.com/office/powerpoint/2010/main" id="1" dur="indefinite" restart="never" nodeType="tmRoot"/>
+      </p:par>
+    </p:tnLst>
+  </p:timing>
+</p:sld>
+</file>
+
+<file path=ppt/slides/slide8.xml><?xml version="1.0" encoding="utf-8"?>
+<p:sld xmlns:a="http://schemas.openxmlformats.org/drawingml/2006/main" xmlns:r="http://schemas.openxmlformats.org/officeDocument/2006/relationships" xmlns:p="http://schemas.openxmlformats.org/presentationml/2006/main">
+  <p:cSld>
+    <p:spTree>
+      <p:nvGrpSpPr>
+        <p:cNvPr id="1" name=""/>
+        <p:cNvGrpSpPr/>
+        <p:nvPr/>
+      </p:nvGrpSpPr>
+      <p:grpSpPr>
+        <a:xfrm>
+          <a:off x="0" y="0"/>
+          <a:ext cx="0" cy="0"/>
+          <a:chOff x="0" y="0"/>
+          <a:chExt cx="0" cy="0"/>
+        </a:xfrm>
+      </p:grpSpPr>
+      <p:graphicFrame>
+        <p:nvGraphicFramePr>
+          <p:cNvPr id="9" name="Table 8"/>
+          <p:cNvGraphicFramePr>
+            <a:graphicFrameLocks noGrp="1"/>
+          </p:cNvGraphicFramePr>
+          <p:nvPr>
+            <p:extLst>
+              <p:ext uri="{D42A27DB-BD31-4B8C-83A1-F6EECF244321}">
+                <p14:modId xmlns:p14="http://schemas.microsoft.com/office/powerpoint/2010/main" val="447568736"/>
+              </p:ext>
+            </p:extLst>
+          </p:nvPr>
+        </p:nvGraphicFramePr>
+        <p:xfrm>
+          <a:off x="1066800" y="381000"/>
+          <a:ext cx="3962400" cy="1463040"/>
+        </p:xfrm>
+        <a:graphic>
+          <a:graphicData uri="http://schemas.openxmlformats.org/drawingml/2006/table">
+            <a:tbl>
+              <a:tblPr firstRow="1" bandRow="1">
+                <a:tableStyleId>{5C22544A-7EE6-4342-B048-85BDC9FD1C3A}</a:tableStyleId>
+              </a:tblPr>
+              <a:tblGrid>
+                <a:gridCol w="3962400"/>
+              </a:tblGrid>
+              <a:tr h="1371600">
+                <a:tc>
+                  <a:txBody>
+                    <a:bodyPr/>
+                    <a:lstStyle/>
+                    <a:p>
+                      <a:endParaRPr lang="en-US" sz="900" b="0" dirty="0" smtClean="0">
+                        <a:solidFill>
+                          <a:schemeClr val="tx1"/>
+                        </a:solidFill>
+                        <a:latin typeface="Courier New" pitchFamily="49" charset="0"/>
+                        <a:cs typeface="Courier New" pitchFamily="49" charset="0"/>
+                      </a:endParaRPr>
+                    </a:p>
+                    <a:p>
+                      <a:r>
+                        <a:rPr lang="en-US" sz="900" b="0" dirty="0" smtClean="0">
+                          <a:solidFill>
+                            <a:schemeClr val="tx1"/>
+                          </a:solidFill>
+                          <a:latin typeface="Courier New" pitchFamily="49" charset="0"/>
+                          <a:cs typeface="Courier New" pitchFamily="49" charset="0"/>
+                        </a:rPr>
+                        <a:t>x86  //</a:t>
+                      </a:r>
+                      <a:r>
+                        <a:rPr lang="en-US" sz="900" b="0" baseline="0" dirty="0" smtClean="0">
+                          <a:solidFill>
+                            <a:schemeClr val="tx1"/>
+                          </a:solidFill>
+                          <a:latin typeface="Courier New" pitchFamily="49" charset="0"/>
+                          <a:cs typeface="Courier New" pitchFamily="49" charset="0"/>
+                        </a:rPr>
+                        <a:t> Trace format </a:t>
+                      </a:r>
+                      <a:endParaRPr lang="en-US" sz="900" b="0" dirty="0" smtClean="0">
+                        <a:solidFill>
+                          <a:schemeClr val="tx1"/>
+                        </a:solidFill>
+                        <a:latin typeface="Courier New" pitchFamily="49" charset="0"/>
+                        <a:cs typeface="Courier New" pitchFamily="49" charset="0"/>
+                      </a:endParaRPr>
+                    </a:p>
+                    <a:p>
+                      <a:r>
+                        <a:rPr lang="en-US" sz="900" b="0" dirty="0" smtClean="0">
+                          <a:solidFill>
+                            <a:schemeClr val="tx1"/>
+                          </a:solidFill>
+                          <a:latin typeface="Courier New" pitchFamily="49" charset="0"/>
+                          <a:cs typeface="Courier New" pitchFamily="49" charset="0"/>
+                        </a:rPr>
+                        <a:t>4    // Total # of threads</a:t>
+                      </a:r>
+                      <a:r>
+                        <a:rPr lang="en-US" sz="900" b="0" baseline="0" dirty="0" smtClean="0">
+                          <a:solidFill>
+                            <a:schemeClr val="tx1"/>
+                          </a:solidFill>
+                          <a:latin typeface="Courier New" pitchFamily="49" charset="0"/>
+                          <a:cs typeface="Courier New" pitchFamily="49" charset="0"/>
+                        </a:rPr>
+                        <a:t> </a:t>
+                      </a:r>
+                      <a:endParaRPr lang="en-US" sz="900" b="0" dirty="0" smtClean="0">
+                        <a:solidFill>
+                          <a:schemeClr val="tx1"/>
+                        </a:solidFill>
+                        <a:latin typeface="Courier New" pitchFamily="49" charset="0"/>
+                        <a:cs typeface="Courier New" pitchFamily="49" charset="0"/>
+                      </a:endParaRPr>
+                    </a:p>
+                    <a:p>
+                      <a:r>
+                        <a:rPr lang="en-US" sz="900" b="0" dirty="0" smtClean="0">
+                          <a:solidFill>
+                            <a:schemeClr val="tx1"/>
+                          </a:solidFill>
+                          <a:latin typeface="Courier New" pitchFamily="49" charset="0"/>
+                          <a:cs typeface="Courier New" pitchFamily="49" charset="0"/>
+                        </a:rPr>
+                        <a:t>0 </a:t>
+                      </a:r>
+                      <a:r>
+                        <a:rPr lang="en-US" sz="900" b="0" dirty="0" smtClean="0">
+                          <a:solidFill>
+                            <a:schemeClr val="tx1"/>
+                          </a:solidFill>
+                          <a:latin typeface="Courier New" pitchFamily="49" charset="0"/>
+                          <a:cs typeface="Courier New" pitchFamily="49" charset="0"/>
+                        </a:rPr>
+                        <a:t>0  // 1</a:t>
+                      </a:r>
+                      <a:r>
+                        <a:rPr lang="en-US" sz="900" b="0" baseline="30000" dirty="0" smtClean="0">
+                          <a:solidFill>
+                            <a:schemeClr val="tx1"/>
+                          </a:solidFill>
+                          <a:latin typeface="Courier New" pitchFamily="49" charset="0"/>
+                          <a:cs typeface="Courier New" pitchFamily="49" charset="0"/>
+                        </a:rPr>
+                        <a:t>st</a:t>
+                      </a:r>
+                      <a:r>
+                        <a:rPr lang="en-US" sz="900" b="0" dirty="0" smtClean="0">
+                          <a:solidFill>
+                            <a:schemeClr val="tx1"/>
+                          </a:solidFill>
+                          <a:latin typeface="Courier New" pitchFamily="49" charset="0"/>
+                          <a:cs typeface="Courier New" pitchFamily="49" charset="0"/>
+                        </a:rPr>
+                        <a:t> thread I</a:t>
+                      </a:r>
+                      <a:r>
+                        <a:rPr lang="en-US" sz="900" b="0" baseline="0" dirty="0" smtClean="0">
+                          <a:solidFill>
+                            <a:schemeClr val="tx1"/>
+                          </a:solidFill>
+                          <a:latin typeface="Courier New" pitchFamily="49" charset="0"/>
+                          <a:cs typeface="Courier New" pitchFamily="49" charset="0"/>
+                        </a:rPr>
+                        <a:t>D | Start Instruction No. </a:t>
+                      </a:r>
+                      <a:endParaRPr lang="en-US" sz="900" b="0" dirty="0" smtClean="0">
+                        <a:solidFill>
+                          <a:schemeClr val="tx1"/>
+                        </a:solidFill>
+                        <a:latin typeface="Courier New" pitchFamily="49" charset="0"/>
+                        <a:cs typeface="Courier New" pitchFamily="49" charset="0"/>
+                      </a:endParaRPr>
+                    </a:p>
+                    <a:p>
+                      <a:pPr marL="0" marR="0" indent="0" algn="l" defTabSz="914400" rtl="0" eaLnBrk="1" fontAlgn="auto" latinLnBrk="0" hangingPunct="1">
+                        <a:lnSpc>
+                          <a:spcPct val="100000"/>
+                        </a:lnSpc>
+                        <a:spcBef>
+                          <a:spcPts val="0"/>
+                        </a:spcBef>
+                        <a:spcAft>
+                          <a:spcPts val="0"/>
+                        </a:spcAft>
+                        <a:buClrTx/>
+                        <a:buSzTx/>
+                        <a:buFontTx/>
+                        <a:buNone/>
+                        <a:tabLst/>
+                        <a:defRPr/>
+                      </a:pPr>
+                      <a:r>
+                        <a:rPr lang="en-US" sz="900" b="0" dirty="0" smtClean="0">
+                          <a:solidFill>
+                            <a:schemeClr val="tx1"/>
+                          </a:solidFill>
+                          <a:latin typeface="Courier New" pitchFamily="49" charset="0"/>
+                          <a:cs typeface="Courier New" pitchFamily="49" charset="0"/>
+                        </a:rPr>
+                        <a:t>1 </a:t>
+                      </a:r>
+                      <a:r>
+                        <a:rPr lang="en-US" sz="900" b="0" dirty="0" smtClean="0">
+                          <a:solidFill>
+                            <a:schemeClr val="tx1"/>
+                          </a:solidFill>
+                          <a:latin typeface="Courier New" pitchFamily="49" charset="0"/>
+                          <a:cs typeface="Courier New" pitchFamily="49" charset="0"/>
+                        </a:rPr>
+                        <a:t>0  // 2</a:t>
+                      </a:r>
+                      <a:r>
+                        <a:rPr lang="en-US" sz="900" b="0" baseline="30000" dirty="0" smtClean="0">
+                          <a:solidFill>
+                            <a:schemeClr val="tx1"/>
+                          </a:solidFill>
+                          <a:latin typeface="Courier New" pitchFamily="49" charset="0"/>
+                          <a:cs typeface="Courier New" pitchFamily="49" charset="0"/>
+                        </a:rPr>
+                        <a:t>nd</a:t>
+                      </a:r>
+                      <a:r>
+                        <a:rPr lang="en-US" sz="900" b="0" baseline="0" dirty="0" smtClean="0">
+                          <a:solidFill>
+                            <a:schemeClr val="tx1"/>
+                          </a:solidFill>
+                          <a:latin typeface="Courier New" pitchFamily="49" charset="0"/>
+                          <a:cs typeface="Courier New" pitchFamily="49" charset="0"/>
+                        </a:rPr>
+                        <a:t> </a:t>
+                      </a:r>
+                      <a:r>
+                        <a:rPr lang="en-US" sz="900" b="0" dirty="0" smtClean="0">
+                          <a:solidFill>
+                            <a:schemeClr val="tx1"/>
+                          </a:solidFill>
+                          <a:latin typeface="Courier New" pitchFamily="49" charset="0"/>
+                          <a:cs typeface="Courier New" pitchFamily="49" charset="0"/>
+                        </a:rPr>
+                        <a:t>thread I</a:t>
+                      </a:r>
+                      <a:r>
+                        <a:rPr lang="en-US" sz="900" b="0" baseline="0" dirty="0" smtClean="0">
+                          <a:solidFill>
+                            <a:schemeClr val="tx1"/>
+                          </a:solidFill>
+                          <a:latin typeface="Courier New" pitchFamily="49" charset="0"/>
+                          <a:cs typeface="Courier New" pitchFamily="49" charset="0"/>
+                        </a:rPr>
+                        <a:t>D | Start Instruction No. </a:t>
+                      </a:r>
+                      <a:endParaRPr lang="en-US" sz="900" b="0" dirty="0" smtClean="0">
+                        <a:solidFill>
+                          <a:schemeClr val="tx1"/>
+                        </a:solidFill>
+                        <a:latin typeface="Courier New" pitchFamily="49" charset="0"/>
+                        <a:cs typeface="Courier New" pitchFamily="49" charset="0"/>
+                      </a:endParaRPr>
+                    </a:p>
+                    <a:p>
+                      <a:pPr marL="0" marR="0" indent="0" algn="l" defTabSz="914400" rtl="0" eaLnBrk="1" fontAlgn="auto" latinLnBrk="0" hangingPunct="1">
+                        <a:lnSpc>
+                          <a:spcPct val="100000"/>
+                        </a:lnSpc>
+                        <a:spcBef>
+                          <a:spcPts val="0"/>
+                        </a:spcBef>
+                        <a:spcAft>
+                          <a:spcPts val="0"/>
+                        </a:spcAft>
+                        <a:buClrTx/>
+                        <a:buSzTx/>
+                        <a:buFontTx/>
+                        <a:buNone/>
+                        <a:tabLst/>
+                        <a:defRPr/>
+                      </a:pPr>
+                      <a:r>
+                        <a:rPr lang="en-US" sz="900" b="0" dirty="0" smtClean="0">
+                          <a:solidFill>
+                            <a:schemeClr val="tx1"/>
+                          </a:solidFill>
+                          <a:latin typeface="Courier New" pitchFamily="49" charset="0"/>
+                          <a:cs typeface="Courier New" pitchFamily="49" charset="0"/>
+                        </a:rPr>
+                        <a:t>2 </a:t>
+                      </a:r>
+                      <a:r>
+                        <a:rPr lang="en-US" sz="900" b="0" dirty="0" smtClean="0">
+                          <a:solidFill>
+                            <a:schemeClr val="tx1"/>
+                          </a:solidFill>
+                          <a:latin typeface="Courier New" pitchFamily="49" charset="0"/>
+                          <a:cs typeface="Courier New" pitchFamily="49" charset="0"/>
+                        </a:rPr>
+                        <a:t>0  // 3</a:t>
+                      </a:r>
+                      <a:r>
+                        <a:rPr lang="en-US" sz="900" b="0" baseline="30000" dirty="0" smtClean="0">
+                          <a:solidFill>
+                            <a:schemeClr val="tx1"/>
+                          </a:solidFill>
+                          <a:latin typeface="Courier New" pitchFamily="49" charset="0"/>
+                          <a:cs typeface="Courier New" pitchFamily="49" charset="0"/>
+                        </a:rPr>
+                        <a:t>rd</a:t>
+                      </a:r>
+                      <a:r>
+                        <a:rPr lang="en-US" sz="900" b="0" baseline="0" dirty="0" smtClean="0">
+                          <a:solidFill>
+                            <a:schemeClr val="tx1"/>
+                          </a:solidFill>
+                          <a:latin typeface="Courier New" pitchFamily="49" charset="0"/>
+                          <a:cs typeface="Courier New" pitchFamily="49" charset="0"/>
+                        </a:rPr>
+                        <a:t> </a:t>
+                      </a:r>
+                      <a:r>
+                        <a:rPr lang="en-US" sz="900" b="0" dirty="0" smtClean="0">
+                          <a:solidFill>
+                            <a:schemeClr val="tx1"/>
+                          </a:solidFill>
+                          <a:latin typeface="Courier New" pitchFamily="49" charset="0"/>
+                          <a:cs typeface="Courier New" pitchFamily="49" charset="0"/>
+                        </a:rPr>
+                        <a:t>thread I</a:t>
+                      </a:r>
+                      <a:r>
+                        <a:rPr lang="en-US" sz="900" b="0" baseline="0" dirty="0" smtClean="0">
+                          <a:solidFill>
+                            <a:schemeClr val="tx1"/>
+                          </a:solidFill>
+                          <a:latin typeface="Courier New" pitchFamily="49" charset="0"/>
+                          <a:cs typeface="Courier New" pitchFamily="49" charset="0"/>
+                        </a:rPr>
+                        <a:t>D | Start Instruction No. </a:t>
+                      </a:r>
+                      <a:endParaRPr lang="en-US" sz="900" b="0" dirty="0" smtClean="0">
+                        <a:solidFill>
+                          <a:schemeClr val="tx1"/>
+                        </a:solidFill>
+                        <a:latin typeface="Courier New" pitchFamily="49" charset="0"/>
+                        <a:cs typeface="Courier New" pitchFamily="49" charset="0"/>
+                      </a:endParaRPr>
+                    </a:p>
+                    <a:p>
+                      <a:pPr marL="0" marR="0" indent="0" algn="l" defTabSz="914400" rtl="0" eaLnBrk="1" fontAlgn="auto" latinLnBrk="0" hangingPunct="1">
+                        <a:lnSpc>
+                          <a:spcPct val="100000"/>
+                        </a:lnSpc>
+                        <a:spcBef>
+                          <a:spcPts val="0"/>
+                        </a:spcBef>
+                        <a:spcAft>
+                          <a:spcPts val="0"/>
+                        </a:spcAft>
+                        <a:buClrTx/>
+                        <a:buSzTx/>
+                        <a:buFontTx/>
+                        <a:buNone/>
+                        <a:tabLst/>
+                        <a:defRPr/>
+                      </a:pPr>
+                      <a:r>
+                        <a:rPr lang="en-US" sz="900" b="0" dirty="0" smtClean="0">
+                          <a:solidFill>
+                            <a:schemeClr val="tx1"/>
+                          </a:solidFill>
+                          <a:latin typeface="Courier New" pitchFamily="49" charset="0"/>
+                          <a:cs typeface="Courier New" pitchFamily="49" charset="0"/>
+                        </a:rPr>
+                        <a:t>3 </a:t>
+                      </a:r>
+                      <a:r>
+                        <a:rPr lang="en-US" sz="900" b="0" dirty="0" smtClean="0">
+                          <a:solidFill>
+                            <a:schemeClr val="tx1"/>
+                          </a:solidFill>
+                          <a:latin typeface="Courier New" pitchFamily="49" charset="0"/>
+                          <a:cs typeface="Courier New" pitchFamily="49" charset="0"/>
+                        </a:rPr>
+                        <a:t>0  // 4</a:t>
+                      </a:r>
+                      <a:r>
+                        <a:rPr lang="en-US" sz="900" b="0" baseline="30000" dirty="0" smtClean="0">
+                          <a:solidFill>
+                            <a:schemeClr val="tx1"/>
+                          </a:solidFill>
+                          <a:latin typeface="Courier New" pitchFamily="49" charset="0"/>
+                          <a:cs typeface="Courier New" pitchFamily="49" charset="0"/>
+                        </a:rPr>
+                        <a:t>th</a:t>
+                      </a:r>
+                      <a:r>
+                        <a:rPr lang="en-US" sz="900" b="0" baseline="0" dirty="0" smtClean="0">
+                          <a:solidFill>
+                            <a:schemeClr val="tx1"/>
+                          </a:solidFill>
+                          <a:latin typeface="Courier New" pitchFamily="49" charset="0"/>
+                          <a:cs typeface="Courier New" pitchFamily="49" charset="0"/>
+                        </a:rPr>
+                        <a:t> </a:t>
+                      </a:r>
+                      <a:r>
+                        <a:rPr lang="en-US" sz="900" b="0" dirty="0" smtClean="0">
+                          <a:solidFill>
+                            <a:schemeClr val="tx1"/>
+                          </a:solidFill>
+                          <a:latin typeface="Courier New" pitchFamily="49" charset="0"/>
+                          <a:cs typeface="Courier New" pitchFamily="49" charset="0"/>
+                        </a:rPr>
+                        <a:t>thread I</a:t>
+                      </a:r>
+                      <a:r>
+                        <a:rPr lang="en-US" sz="900" b="0" baseline="0" dirty="0" smtClean="0">
+                          <a:solidFill>
+                            <a:schemeClr val="tx1"/>
+                          </a:solidFill>
+                          <a:latin typeface="Courier New" pitchFamily="49" charset="0"/>
+                          <a:cs typeface="Courier New" pitchFamily="49" charset="0"/>
+                        </a:rPr>
+                        <a:t>D | Start Instruction No. </a:t>
+                      </a:r>
+                      <a:endParaRPr lang="en-US" sz="900" b="0" dirty="0" smtClean="0">
+                        <a:solidFill>
+                          <a:schemeClr val="tx1"/>
+                        </a:solidFill>
+                        <a:latin typeface="Courier New" pitchFamily="49" charset="0"/>
+                        <a:cs typeface="Courier New" pitchFamily="49" charset="0"/>
+                      </a:endParaRPr>
+                    </a:p>
+                    <a:p>
+                      <a:endParaRPr lang="en-US" sz="900" b="0" dirty="0" smtClean="0">
+                        <a:solidFill>
+                          <a:schemeClr val="tx1"/>
+                        </a:solidFill>
+                        <a:latin typeface="Courier New" pitchFamily="49" charset="0"/>
+                        <a:cs typeface="Courier New" pitchFamily="49" charset="0"/>
+                      </a:endParaRPr>
+                    </a:p>
+                    <a:p>
+                      <a:endParaRPr lang="en-US" sz="900" b="0" dirty="0" smtClean="0">
+                        <a:solidFill>
+                          <a:schemeClr val="tx1"/>
+                        </a:solidFill>
+                        <a:latin typeface="Courier New" pitchFamily="49" charset="0"/>
+                        <a:cs typeface="Courier New" pitchFamily="49" charset="0"/>
+                      </a:endParaRPr>
+                    </a:p>
+                    <a:p>
+                      <a:r>
+                        <a:rPr lang="en-US" sz="900" b="0" dirty="0" smtClean="0">
+                          <a:solidFill>
+                            <a:schemeClr val="tx1"/>
+                          </a:solidFill>
+                          <a:latin typeface="Courier New" pitchFamily="49" charset="0"/>
+                          <a:cs typeface="Courier New" pitchFamily="49" charset="0"/>
+                        </a:rPr>
+                        <a:t>(a) </a:t>
+                      </a:r>
+                      <a:r>
+                        <a:rPr lang="en-US" sz="900" b="0" dirty="0" err="1" smtClean="0">
+                          <a:solidFill>
+                            <a:schemeClr val="tx1"/>
+                          </a:solidFill>
+                          <a:latin typeface="Courier New" pitchFamily="49" charset="0"/>
+                          <a:cs typeface="Courier New" pitchFamily="49" charset="0"/>
+                        </a:rPr>
+                        <a:t>Trace.txt</a:t>
+                      </a:r>
+                      <a:r>
+                        <a:rPr lang="en-US" sz="900" b="0" dirty="0" smtClean="0">
+                          <a:solidFill>
+                            <a:schemeClr val="tx1"/>
+                          </a:solidFill>
+                          <a:latin typeface="Courier New" pitchFamily="49" charset="0"/>
+                          <a:cs typeface="Courier New" pitchFamily="49" charset="0"/>
+                        </a:rPr>
+                        <a:t> (CPU) </a:t>
+                      </a:r>
+                      <a:endParaRPr lang="en-US" sz="900" b="0" dirty="0">
+                        <a:solidFill>
+                          <a:schemeClr val="tx1"/>
+                        </a:solidFill>
+                        <a:latin typeface="Courier New" pitchFamily="49" charset="0"/>
+                        <a:cs typeface="Courier New" pitchFamily="49" charset="0"/>
+                      </a:endParaRPr>
+                    </a:p>
+                  </a:txBody>
+                  <a:tcPr>
+                    <a:solidFill>
+                      <a:schemeClr val="bg1"/>
+                    </a:solidFill>
+                  </a:tcPr>
+                </a:tc>
+              </a:tr>
+            </a:tbl>
+          </a:graphicData>
+        </a:graphic>
+      </p:graphicFrame>
+      <p:sp>
+        <p:nvSpPr>
+          <p:cNvPr id="61" name="Left Brace 60"/>
+          <p:cNvSpPr/>
+          <p:nvPr/>
+        </p:nvSpPr>
+        <p:spPr>
+          <a:xfrm>
+            <a:off x="914400" y="2667000"/>
+            <a:ext cx="152400" cy="533400"/>
+          </a:xfrm>
+          <a:prstGeom prst="leftBrace">
+            <a:avLst/>
+          </a:prstGeom>
+          <a:ln w="3175">
+            <a:solidFill>
+              <a:schemeClr val="tx1"/>
+            </a:solidFill>
+          </a:ln>
+        </p:spPr>
+        <p:style>
+          <a:lnRef idx="1">
+            <a:schemeClr val="accent1"/>
+          </a:lnRef>
+          <a:fillRef idx="0">
+            <a:schemeClr val="accent1"/>
+          </a:fillRef>
+          <a:effectRef idx="0">
+            <a:schemeClr val="accent1"/>
+          </a:effectRef>
+          <a:fontRef idx="minor">
+            <a:schemeClr val="tx1"/>
+          </a:fontRef>
+        </p:style>
+        <p:txBody>
+          <a:bodyPr rtlCol="0" anchor="ctr"/>
+          <a:lstStyle/>
+          <a:p>
+            <a:pPr algn="ctr"/>
+            <a:endParaRPr lang="en-US"/>
+          </a:p>
+        </p:txBody>
+      </p:sp>
+      <p:sp>
+        <p:nvSpPr>
+          <p:cNvPr id="62" name="Left Brace 61"/>
+          <p:cNvSpPr/>
+          <p:nvPr/>
+        </p:nvSpPr>
+        <p:spPr>
+          <a:xfrm>
+            <a:off x="914400" y="3226533"/>
+            <a:ext cx="121919" cy="354867"/>
+          </a:xfrm>
+          <a:prstGeom prst="leftBrace">
+            <a:avLst/>
+          </a:prstGeom>
+          <a:ln w="3175">
+            <a:solidFill>
+              <a:schemeClr val="tx1"/>
+            </a:solidFill>
+          </a:ln>
+        </p:spPr>
+        <p:style>
+          <a:lnRef idx="1">
+            <a:schemeClr val="accent1"/>
+          </a:lnRef>
+          <a:fillRef idx="0">
+            <a:schemeClr val="accent1"/>
+          </a:fillRef>
+          <a:effectRef idx="0">
+            <a:schemeClr val="accent1"/>
+          </a:effectRef>
+          <a:fontRef idx="minor">
+            <a:schemeClr val="tx1"/>
+          </a:fontRef>
+        </p:style>
+        <p:txBody>
+          <a:bodyPr rtlCol="0" anchor="ctr"/>
+          <a:lstStyle/>
+          <a:p>
+            <a:pPr algn="ctr"/>
+            <a:endParaRPr lang="en-US"/>
+          </a:p>
+        </p:txBody>
+      </p:sp>
+      <p:sp>
+        <p:nvSpPr>
+          <p:cNvPr id="63" name="TextBox 62"/>
+          <p:cNvSpPr txBox="1"/>
+          <p:nvPr/>
+        </p:nvSpPr>
+        <p:spPr>
+          <a:xfrm>
+            <a:off x="198662" y="2667000"/>
+            <a:ext cx="563338" cy="307777"/>
+          </a:xfrm>
+          <a:prstGeom prst="rect">
+            <a:avLst/>
+          </a:prstGeom>
+          <a:noFill/>
+        </p:spPr>
+        <p:txBody>
+          <a:bodyPr wrap="square" rtlCol="0">
+            <a:spAutoFit/>
+          </a:bodyPr>
+          <a:lstStyle/>
+          <a:p>
+            <a:r>
+              <a:rPr lang="en-US" sz="700" dirty="0" smtClean="0">
+                <a:latin typeface="Courier New" pitchFamily="49" charset="0"/>
+                <a:cs typeface="Courier New" pitchFamily="49" charset="0"/>
+              </a:rPr>
+              <a:t>Thread</a:t>
+            </a:r>
+          </a:p>
+          <a:p>
+            <a:r>
+              <a:rPr lang="en-US" sz="700" dirty="0" smtClean="0">
+                <a:latin typeface="Courier New" pitchFamily="49" charset="0"/>
+                <a:cs typeface="Courier New" pitchFamily="49" charset="0"/>
+              </a:rPr>
+              <a:t>Block 0</a:t>
+            </a:r>
+            <a:endParaRPr lang="en-US" sz="700" dirty="0">
+              <a:latin typeface="Courier New" pitchFamily="49" charset="0"/>
+              <a:cs typeface="Courier New" pitchFamily="49" charset="0"/>
+            </a:endParaRPr>
+          </a:p>
+        </p:txBody>
+      </p:sp>
+      <p:sp>
+        <p:nvSpPr>
+          <p:cNvPr id="64" name="TextBox 63"/>
+          <p:cNvSpPr txBox="1"/>
+          <p:nvPr/>
+        </p:nvSpPr>
+        <p:spPr>
+          <a:xfrm>
+            <a:off x="198662" y="3200400"/>
+            <a:ext cx="661708" cy="307777"/>
+          </a:xfrm>
+          <a:prstGeom prst="rect">
+            <a:avLst/>
+          </a:prstGeom>
+          <a:noFill/>
+        </p:spPr>
+        <p:txBody>
+          <a:bodyPr wrap="square" rtlCol="0">
+            <a:spAutoFit/>
+          </a:bodyPr>
+          <a:lstStyle/>
+          <a:p>
+            <a:r>
+              <a:rPr lang="en-US" sz="700" dirty="0" smtClean="0">
+                <a:latin typeface="Courier New" pitchFamily="49" charset="0"/>
+                <a:cs typeface="Courier New" pitchFamily="49" charset="0"/>
+              </a:rPr>
+              <a:t>Thread Block 1</a:t>
+            </a:r>
+            <a:endParaRPr lang="en-US" sz="700" dirty="0">
+              <a:latin typeface="Courier New" pitchFamily="49" charset="0"/>
+              <a:cs typeface="Courier New" pitchFamily="49" charset="0"/>
+            </a:endParaRPr>
+          </a:p>
+        </p:txBody>
+      </p:sp>
+      <p:graphicFrame>
+        <p:nvGraphicFramePr>
+          <p:cNvPr id="70" name="Table 69"/>
+          <p:cNvGraphicFramePr>
+            <a:graphicFrameLocks noGrp="1"/>
+          </p:cNvGraphicFramePr>
+          <p:nvPr>
+            <p:extLst>
+              <p:ext uri="{D42A27DB-BD31-4B8C-83A1-F6EECF244321}">
+                <p14:modId xmlns:p14="http://schemas.microsoft.com/office/powerpoint/2010/main" val="1641107365"/>
+              </p:ext>
+            </p:extLst>
+          </p:nvPr>
+        </p:nvGraphicFramePr>
+        <p:xfrm>
+          <a:off x="1066800" y="1905000"/>
+          <a:ext cx="3962400" cy="2423160"/>
+        </p:xfrm>
+        <a:graphic>
+          <a:graphicData uri="http://schemas.openxmlformats.org/drawingml/2006/table">
+            <a:tbl>
+              <a:tblPr firstRow="1" bandRow="1">
+                <a:tableStyleId>{5C22544A-7EE6-4342-B048-85BDC9FD1C3A}</a:tableStyleId>
+              </a:tblPr>
+              <a:tblGrid>
+                <a:gridCol w="3962400"/>
+              </a:tblGrid>
+              <a:tr h="1371600">
+                <a:tc>
+                  <a:txBody>
+                    <a:bodyPr/>
+                    <a:lstStyle/>
+                    <a:p>
+                      <a:r>
+                        <a:rPr lang="en-US" sz="900" b="0" dirty="0" smtClean="0">
+                          <a:solidFill>
+                            <a:schemeClr val="tx1"/>
+                          </a:solidFill>
+                          <a:latin typeface="Courier New" pitchFamily="49" charset="0"/>
+                          <a:cs typeface="Courier New" pitchFamily="49" charset="0"/>
+                        </a:rPr>
+                        <a:t>GPU    // Trace format</a:t>
+                      </a:r>
+                      <a:r>
+                        <a:rPr lang="en-US" sz="900" b="0" baseline="0" dirty="0" smtClean="0">
+                          <a:solidFill>
+                            <a:schemeClr val="tx1"/>
+                          </a:solidFill>
+                          <a:latin typeface="Courier New" pitchFamily="49" charset="0"/>
+                          <a:cs typeface="Courier New" pitchFamily="49" charset="0"/>
+                        </a:rPr>
+                        <a:t> </a:t>
+                      </a:r>
+                      <a:endParaRPr lang="en-US" sz="900" b="0" dirty="0" smtClean="0">
+                        <a:solidFill>
+                          <a:schemeClr val="tx1"/>
+                        </a:solidFill>
+                        <a:latin typeface="Courier New" pitchFamily="49" charset="0"/>
+                        <a:cs typeface="Courier New" pitchFamily="49" charset="0"/>
+                      </a:endParaRPr>
+                    </a:p>
+                    <a:p>
+                      <a:r>
+                        <a:rPr lang="en-US" sz="900" b="0" dirty="0" err="1" smtClean="0">
+                          <a:solidFill>
+                            <a:schemeClr val="tx1"/>
+                          </a:solidFill>
+                          <a:latin typeface="Courier New" pitchFamily="49" charset="0"/>
+                          <a:cs typeface="Courier New" pitchFamily="49" charset="0"/>
+                        </a:rPr>
+                        <a:t>newptx</a:t>
+                      </a:r>
+                      <a:r>
+                        <a:rPr lang="en-US" sz="900" b="0" dirty="0" smtClean="0">
+                          <a:solidFill>
+                            <a:schemeClr val="tx1"/>
+                          </a:solidFill>
+                          <a:latin typeface="Courier New" pitchFamily="49" charset="0"/>
+                          <a:cs typeface="Courier New" pitchFamily="49" charset="0"/>
+                        </a:rPr>
+                        <a:t> // Trace Type </a:t>
+                      </a:r>
+                    </a:p>
+                    <a:p>
+                      <a:r>
+                        <a:rPr lang="en-US" sz="900" b="0" dirty="0" smtClean="0">
+                          <a:solidFill>
+                            <a:schemeClr val="tx1"/>
+                          </a:solidFill>
+                          <a:latin typeface="Courier New" pitchFamily="49" charset="0"/>
+                          <a:cs typeface="Courier New" pitchFamily="49" charset="0"/>
+                        </a:rPr>
+                        <a:t>14    // GPU Trace version </a:t>
+                      </a:r>
+                    </a:p>
+                    <a:p>
+                      <a:r>
+                        <a:rPr lang="en-US" sz="900" b="0" dirty="0" smtClean="0">
+                          <a:solidFill>
+                            <a:schemeClr val="tx1"/>
+                          </a:solidFill>
+                          <a:latin typeface="Courier New" pitchFamily="49" charset="0"/>
+                          <a:cs typeface="Courier New" pitchFamily="49" charset="0"/>
+                        </a:rPr>
+                        <a:t>6      // Max blocks per core </a:t>
+                      </a:r>
+                      <a:endParaRPr lang="en-US" sz="900" b="0" dirty="0" smtClean="0">
+                        <a:solidFill>
+                          <a:schemeClr val="tx1"/>
+                        </a:solidFill>
+                        <a:latin typeface="Courier New" pitchFamily="49" charset="0"/>
+                        <a:cs typeface="Courier New" pitchFamily="49" charset="0"/>
+                      </a:endParaRPr>
+                    </a:p>
+                    <a:p>
+                      <a:r>
+                        <a:rPr lang="en-US" sz="900" b="0" dirty="0" smtClean="0">
+                          <a:solidFill>
+                            <a:schemeClr val="tx1"/>
+                          </a:solidFill>
+                          <a:latin typeface="Courier New" pitchFamily="49" charset="0"/>
+                          <a:cs typeface="Courier New" pitchFamily="49" charset="0"/>
+                        </a:rPr>
+                        <a:t>2048 </a:t>
+                      </a:r>
+                      <a:r>
+                        <a:rPr lang="en-US" sz="900" b="0" dirty="0" smtClean="0">
+                          <a:solidFill>
+                            <a:schemeClr val="tx1"/>
+                          </a:solidFill>
+                          <a:latin typeface="Courier New" pitchFamily="49" charset="0"/>
+                          <a:cs typeface="Courier New" pitchFamily="49" charset="0"/>
+                        </a:rPr>
+                        <a:t>  // Total # of (warp)</a:t>
+                      </a:r>
+                      <a:r>
+                        <a:rPr lang="en-US" sz="900" b="0" baseline="0" dirty="0" smtClean="0">
+                          <a:solidFill>
+                            <a:schemeClr val="tx1"/>
+                          </a:solidFill>
+                          <a:latin typeface="Courier New" pitchFamily="49" charset="0"/>
+                          <a:cs typeface="Courier New" pitchFamily="49" charset="0"/>
+                        </a:rPr>
+                        <a:t> </a:t>
+                      </a:r>
+                      <a:endParaRPr lang="en-US" sz="900" b="0" dirty="0" smtClean="0">
+                        <a:solidFill>
+                          <a:schemeClr val="tx1"/>
+                        </a:solidFill>
+                        <a:latin typeface="Courier New" pitchFamily="49" charset="0"/>
+                        <a:cs typeface="Courier New" pitchFamily="49" charset="0"/>
+                      </a:endParaRPr>
+                    </a:p>
+                    <a:p>
+                      <a:r>
+                        <a:rPr lang="en-US" sz="900" b="0" dirty="0" smtClean="0">
+                          <a:solidFill>
+                            <a:schemeClr val="tx1"/>
+                          </a:solidFill>
+                          <a:latin typeface="Courier New" pitchFamily="49" charset="0"/>
+                          <a:cs typeface="Courier New" pitchFamily="49" charset="0"/>
+                        </a:rPr>
+                        <a:t>0     0  1</a:t>
+                      </a:r>
+                      <a:r>
+                        <a:rPr lang="en-US" sz="900" b="0" baseline="30000" dirty="0" smtClean="0">
+                          <a:solidFill>
+                            <a:schemeClr val="tx1"/>
+                          </a:solidFill>
+                          <a:latin typeface="Courier New" pitchFamily="49" charset="0"/>
+                          <a:cs typeface="Courier New" pitchFamily="49" charset="0"/>
+                        </a:rPr>
+                        <a:t>st</a:t>
+                      </a:r>
+                      <a:r>
+                        <a:rPr lang="en-US" sz="900" b="0" dirty="0" smtClean="0">
+                          <a:solidFill>
+                            <a:schemeClr val="tx1"/>
+                          </a:solidFill>
+                          <a:latin typeface="Courier New" pitchFamily="49" charset="0"/>
+                          <a:cs typeface="Courier New" pitchFamily="49" charset="0"/>
+                        </a:rPr>
+                        <a:t> warp I</a:t>
+                      </a:r>
+                      <a:r>
+                        <a:rPr lang="en-US" sz="900" b="0" baseline="0" dirty="0" smtClean="0">
+                          <a:solidFill>
+                            <a:schemeClr val="tx1"/>
+                          </a:solidFill>
+                          <a:latin typeface="Courier New" pitchFamily="49" charset="0"/>
+                          <a:cs typeface="Courier New" pitchFamily="49" charset="0"/>
+                        </a:rPr>
+                        <a:t>D | Start Instruction No. </a:t>
+                      </a:r>
+                      <a:endParaRPr lang="en-US" sz="900" b="0" dirty="0" smtClean="0">
+                        <a:solidFill>
+                          <a:schemeClr val="tx1"/>
+                        </a:solidFill>
+                        <a:latin typeface="Courier New" pitchFamily="49" charset="0"/>
+                        <a:cs typeface="Courier New" pitchFamily="49" charset="0"/>
+                      </a:endParaRPr>
+                    </a:p>
+                    <a:p>
+                      <a:r>
+                        <a:rPr lang="en-US" sz="900" b="0" dirty="0" smtClean="0">
+                          <a:solidFill>
+                            <a:schemeClr val="tx1"/>
+                          </a:solidFill>
+                          <a:latin typeface="Courier New" pitchFamily="49" charset="0"/>
+                          <a:cs typeface="Courier New" pitchFamily="49" charset="0"/>
+                        </a:rPr>
+                        <a:t>1     0  2</a:t>
+                      </a:r>
+                      <a:r>
+                        <a:rPr lang="en-US" sz="900" b="0" baseline="30000" dirty="0" smtClean="0">
+                          <a:solidFill>
+                            <a:schemeClr val="tx1"/>
+                          </a:solidFill>
+                          <a:latin typeface="Courier New" pitchFamily="49" charset="0"/>
+                          <a:cs typeface="Courier New" pitchFamily="49" charset="0"/>
+                        </a:rPr>
+                        <a:t>nd</a:t>
+                      </a:r>
+                      <a:r>
+                        <a:rPr lang="en-US" sz="900" b="0" baseline="0" dirty="0" smtClean="0">
+                          <a:solidFill>
+                            <a:schemeClr val="tx1"/>
+                          </a:solidFill>
+                          <a:latin typeface="Courier New" pitchFamily="49" charset="0"/>
+                          <a:cs typeface="Courier New" pitchFamily="49" charset="0"/>
+                        </a:rPr>
+                        <a:t> </a:t>
+                      </a:r>
+                      <a:r>
+                        <a:rPr lang="en-US" sz="900" b="0" dirty="0" smtClean="0">
+                          <a:solidFill>
+                            <a:schemeClr val="tx1"/>
+                          </a:solidFill>
+                          <a:latin typeface="Courier New" pitchFamily="49" charset="0"/>
+                          <a:cs typeface="Courier New" pitchFamily="49" charset="0"/>
+                        </a:rPr>
+                        <a:t>warp I</a:t>
+                      </a:r>
+                      <a:r>
+                        <a:rPr lang="en-US" sz="900" b="0" baseline="0" dirty="0" smtClean="0">
+                          <a:solidFill>
+                            <a:schemeClr val="tx1"/>
+                          </a:solidFill>
+                          <a:latin typeface="Courier New" pitchFamily="49" charset="0"/>
+                          <a:cs typeface="Courier New" pitchFamily="49" charset="0"/>
+                        </a:rPr>
+                        <a:t>D | Start Instruction No. </a:t>
+                      </a:r>
+                      <a:endParaRPr lang="en-US" sz="900" b="0" dirty="0" smtClean="0">
+                        <a:solidFill>
+                          <a:schemeClr val="tx1"/>
+                        </a:solidFill>
+                        <a:latin typeface="Courier New" pitchFamily="49" charset="0"/>
+                        <a:cs typeface="Courier New" pitchFamily="49" charset="0"/>
+                      </a:endParaRPr>
+                    </a:p>
+                    <a:p>
+                      <a:r>
+                        <a:rPr lang="en-US" sz="900" b="0" dirty="0" smtClean="0">
+                          <a:solidFill>
+                            <a:schemeClr val="tx1"/>
+                          </a:solidFill>
+                          <a:latin typeface="Courier New" pitchFamily="49" charset="0"/>
+                          <a:cs typeface="Courier New" pitchFamily="49" charset="0"/>
+                        </a:rPr>
+                        <a:t>2     0  3</a:t>
+                      </a:r>
+                      <a:r>
+                        <a:rPr lang="en-US" sz="900" b="0" baseline="30000" dirty="0" smtClean="0">
+                          <a:solidFill>
+                            <a:schemeClr val="tx1"/>
+                          </a:solidFill>
+                          <a:latin typeface="Courier New" pitchFamily="49" charset="0"/>
+                          <a:cs typeface="Courier New" pitchFamily="49" charset="0"/>
+                        </a:rPr>
+                        <a:t>rd</a:t>
+                      </a:r>
+                      <a:r>
+                        <a:rPr lang="en-US" sz="900" b="0" baseline="0" dirty="0" smtClean="0">
+                          <a:solidFill>
+                            <a:schemeClr val="tx1"/>
+                          </a:solidFill>
+                          <a:latin typeface="Courier New" pitchFamily="49" charset="0"/>
+                          <a:cs typeface="Courier New" pitchFamily="49" charset="0"/>
+                        </a:rPr>
+                        <a:t> </a:t>
+                      </a:r>
+                      <a:r>
+                        <a:rPr lang="en-US" sz="900" b="0" dirty="0" smtClean="0">
+                          <a:solidFill>
+                            <a:schemeClr val="tx1"/>
+                          </a:solidFill>
+                          <a:latin typeface="Courier New" pitchFamily="49" charset="0"/>
+                          <a:cs typeface="Courier New" pitchFamily="49" charset="0"/>
+                        </a:rPr>
+                        <a:t>warp I</a:t>
+                      </a:r>
+                      <a:r>
+                        <a:rPr lang="en-US" sz="900" b="0" baseline="0" dirty="0" smtClean="0">
+                          <a:solidFill>
+                            <a:schemeClr val="tx1"/>
+                          </a:solidFill>
+                          <a:latin typeface="Courier New" pitchFamily="49" charset="0"/>
+                          <a:cs typeface="Courier New" pitchFamily="49" charset="0"/>
+                        </a:rPr>
+                        <a:t>D | Start Instruction No. </a:t>
+                      </a:r>
+                      <a:endParaRPr lang="en-US" sz="900" b="0" dirty="0" smtClean="0">
+                        <a:solidFill>
+                          <a:schemeClr val="tx1"/>
+                        </a:solidFill>
+                        <a:latin typeface="Courier New" pitchFamily="49" charset="0"/>
+                        <a:cs typeface="Courier New" pitchFamily="49" charset="0"/>
+                      </a:endParaRPr>
+                    </a:p>
+                    <a:p>
+                      <a:r>
+                        <a:rPr lang="en-US" sz="900" b="0" dirty="0" smtClean="0">
+                          <a:solidFill>
+                            <a:schemeClr val="tx1"/>
+                          </a:solidFill>
+                          <a:latin typeface="Courier New" pitchFamily="49" charset="0"/>
+                          <a:cs typeface="Courier New" pitchFamily="49" charset="0"/>
+                        </a:rPr>
+                        <a:t>3     </a:t>
+                      </a:r>
+                      <a:r>
+                        <a:rPr lang="en-US" sz="900" b="0" dirty="0" smtClean="0">
+                          <a:solidFill>
+                            <a:schemeClr val="tx1"/>
+                          </a:solidFill>
+                          <a:latin typeface="Courier New" pitchFamily="49" charset="0"/>
+                          <a:cs typeface="Courier New" pitchFamily="49" charset="0"/>
+                        </a:rPr>
+                        <a:t>0  4</a:t>
+                      </a:r>
+                      <a:r>
+                        <a:rPr lang="en-US" sz="900" b="0" baseline="30000" dirty="0" smtClean="0">
+                          <a:solidFill>
+                            <a:schemeClr val="tx1"/>
+                          </a:solidFill>
+                          <a:latin typeface="Courier New" pitchFamily="49" charset="0"/>
+                          <a:cs typeface="Courier New" pitchFamily="49" charset="0"/>
+                        </a:rPr>
+                        <a:t>th</a:t>
+                      </a:r>
+                      <a:r>
+                        <a:rPr lang="en-US" sz="900" b="0" baseline="0" dirty="0" smtClean="0">
+                          <a:solidFill>
+                            <a:schemeClr val="tx1"/>
+                          </a:solidFill>
+                          <a:latin typeface="Courier New" pitchFamily="49" charset="0"/>
+                          <a:cs typeface="Courier New" pitchFamily="49" charset="0"/>
+                        </a:rPr>
+                        <a:t> </a:t>
+                      </a:r>
+                      <a:r>
+                        <a:rPr lang="en-US" sz="900" b="0" dirty="0" smtClean="0">
+                          <a:solidFill>
+                            <a:schemeClr val="tx1"/>
+                          </a:solidFill>
+                          <a:latin typeface="Courier New" pitchFamily="49" charset="0"/>
+                          <a:cs typeface="Courier New" pitchFamily="49" charset="0"/>
+                        </a:rPr>
+                        <a:t>warp I</a:t>
+                      </a:r>
+                      <a:r>
+                        <a:rPr lang="en-US" sz="900" b="0" baseline="0" dirty="0" smtClean="0">
+                          <a:solidFill>
+                            <a:schemeClr val="tx1"/>
+                          </a:solidFill>
+                          <a:latin typeface="Courier New" pitchFamily="49" charset="0"/>
+                          <a:cs typeface="Courier New" pitchFamily="49" charset="0"/>
+                        </a:rPr>
+                        <a:t>D | Start Instruction No. </a:t>
+                      </a:r>
+                      <a:endParaRPr lang="en-US" sz="900" b="0" dirty="0" smtClean="0">
+                        <a:solidFill>
+                          <a:schemeClr val="tx1"/>
+                        </a:solidFill>
+                        <a:latin typeface="Courier New" pitchFamily="49" charset="0"/>
+                        <a:cs typeface="Courier New" pitchFamily="49" charset="0"/>
+                      </a:endParaRPr>
+                    </a:p>
+                    <a:p>
+                      <a:r>
+                        <a:rPr lang="en-US" sz="900" b="0" dirty="0" smtClean="0">
+                          <a:solidFill>
+                            <a:schemeClr val="tx1"/>
+                          </a:solidFill>
+                          <a:latin typeface="Courier New" pitchFamily="49" charset="0"/>
+                          <a:cs typeface="Courier New" pitchFamily="49" charset="0"/>
+                        </a:rPr>
+                        <a:t>65536 </a:t>
+                      </a:r>
+                      <a:r>
+                        <a:rPr lang="en-US" sz="900" b="0" dirty="0" smtClean="0">
+                          <a:solidFill>
+                            <a:schemeClr val="tx1"/>
+                          </a:solidFill>
+                          <a:latin typeface="Courier New" pitchFamily="49" charset="0"/>
+                          <a:cs typeface="Courier New" pitchFamily="49" charset="0"/>
+                        </a:rPr>
+                        <a:t>0  </a:t>
+                      </a:r>
+                      <a:endParaRPr lang="en-US" sz="900" b="0" dirty="0" smtClean="0">
+                        <a:solidFill>
+                          <a:schemeClr val="tx1"/>
+                        </a:solidFill>
+                        <a:latin typeface="Courier New" pitchFamily="49" charset="0"/>
+                        <a:cs typeface="Courier New" pitchFamily="49" charset="0"/>
+                      </a:endParaRPr>
+                    </a:p>
+                    <a:p>
+                      <a:r>
+                        <a:rPr lang="en-US" sz="900" b="0" dirty="0" smtClean="0">
+                          <a:solidFill>
+                            <a:schemeClr val="tx1"/>
+                          </a:solidFill>
+                          <a:latin typeface="Courier New" pitchFamily="49" charset="0"/>
+                          <a:cs typeface="Courier New" pitchFamily="49" charset="0"/>
+                        </a:rPr>
+                        <a:t>65537 0</a:t>
+                      </a:r>
+                    </a:p>
+                    <a:p>
+                      <a:r>
+                        <a:rPr lang="en-US" sz="900" b="0" dirty="0" smtClean="0">
+                          <a:solidFill>
+                            <a:schemeClr val="tx1"/>
+                          </a:solidFill>
+                          <a:latin typeface="Courier New" pitchFamily="49" charset="0"/>
+                          <a:cs typeface="Courier New" pitchFamily="49" charset="0"/>
+                        </a:rPr>
+                        <a:t>…</a:t>
+                      </a:r>
+                    </a:p>
+                    <a:p>
+                      <a:endParaRPr lang="en-US" sz="900" b="0" dirty="0" smtClean="0">
+                        <a:solidFill>
+                          <a:schemeClr val="tx1"/>
+                        </a:solidFill>
+                        <a:latin typeface="Courier New" pitchFamily="49" charset="0"/>
+                        <a:cs typeface="Courier New" pitchFamily="49" charset="0"/>
+                      </a:endParaRPr>
+                    </a:p>
+                    <a:p>
+                      <a:r>
+                        <a:rPr lang="en-US" sz="900" b="0" dirty="0" smtClean="0">
+                          <a:solidFill>
+                            <a:schemeClr val="tx1"/>
+                          </a:solidFill>
+                          <a:latin typeface="Courier New" pitchFamily="49" charset="0"/>
+                          <a:cs typeface="Courier New" pitchFamily="49" charset="0"/>
+                        </a:rPr>
+                        <a:t>(b) GPU </a:t>
+                      </a:r>
+                      <a:r>
+                        <a:rPr lang="en-US" sz="900" b="0" dirty="0" err="1" smtClean="0">
+                          <a:solidFill>
+                            <a:schemeClr val="tx1"/>
+                          </a:solidFill>
+                          <a:latin typeface="Courier New" pitchFamily="49" charset="0"/>
+                          <a:cs typeface="Courier New" pitchFamily="49" charset="0"/>
+                        </a:rPr>
+                        <a:t>Trace.txt</a:t>
+                      </a:r>
+                      <a:r>
+                        <a:rPr lang="en-US" sz="900" b="0" baseline="0" dirty="0" smtClean="0">
+                          <a:solidFill>
+                            <a:schemeClr val="tx1"/>
+                          </a:solidFill>
+                          <a:latin typeface="Courier New" pitchFamily="49" charset="0"/>
+                          <a:cs typeface="Courier New" pitchFamily="49" charset="0"/>
+                        </a:rPr>
+                        <a:t> </a:t>
+                      </a:r>
+                    </a:p>
+                    <a:p>
+                      <a:endParaRPr lang="en-US" sz="900" b="0" dirty="0" smtClean="0">
+                        <a:solidFill>
+                          <a:schemeClr val="tx1"/>
+                        </a:solidFill>
+                        <a:latin typeface="Courier New" pitchFamily="49" charset="0"/>
+                        <a:cs typeface="Courier New" pitchFamily="49" charset="0"/>
+                      </a:endParaRPr>
+                    </a:p>
+                    <a:p>
+                      <a:endParaRPr lang="en-US" sz="900" b="0" dirty="0" smtClean="0">
+                        <a:solidFill>
+                          <a:schemeClr val="tx1"/>
+                        </a:solidFill>
+                        <a:latin typeface="Courier New" pitchFamily="49" charset="0"/>
+                        <a:cs typeface="Courier New" pitchFamily="49" charset="0"/>
+                      </a:endParaRPr>
+                    </a:p>
+                    <a:p>
+                      <a:endParaRPr lang="en-US" sz="900" b="0" dirty="0">
+                        <a:solidFill>
+                          <a:schemeClr val="tx1"/>
+                        </a:solidFill>
+                        <a:latin typeface="Courier New" pitchFamily="49" charset="0"/>
+                        <a:cs typeface="Courier New" pitchFamily="49" charset="0"/>
+                      </a:endParaRPr>
+                    </a:p>
+                  </a:txBody>
+                  <a:tcPr>
+                    <a:solidFill>
+                      <a:schemeClr val="bg1"/>
+                    </a:solidFill>
+                  </a:tcPr>
+                </a:tc>
+              </a:tr>
+            </a:tbl>
+          </a:graphicData>
+        </a:graphic>
+      </p:graphicFrame>
+      <p:sp>
+        <p:nvSpPr>
+          <p:cNvPr id="74" name="Rectangle 73"/>
+          <p:cNvSpPr/>
+          <p:nvPr/>
+        </p:nvSpPr>
+        <p:spPr>
+          <a:xfrm>
+            <a:off x="1066800" y="838200"/>
+            <a:ext cx="3352800" cy="609600"/>
+          </a:xfrm>
+          <a:prstGeom prst="rect">
+            <a:avLst/>
+          </a:prstGeom>
+          <a:solidFill>
+            <a:schemeClr val="bg2">
+              <a:lumMod val="75000"/>
+              <a:alpha val="58000"/>
+            </a:schemeClr>
+          </a:solidFill>
+          <a:ln>
+            <a:noFill/>
+          </a:ln>
+        </p:spPr>
+        <p:style>
+          <a:lnRef idx="2">
+            <a:schemeClr val="accent1">
+              <a:shade val="50000"/>
+            </a:schemeClr>
+          </a:lnRef>
+          <a:fillRef idx="1">
+            <a:schemeClr val="accent1"/>
+          </a:fillRef>
+          <a:effectRef idx="0">
+            <a:schemeClr val="accent1"/>
+          </a:effectRef>
+          <a:fontRef idx="minor">
+            <a:schemeClr val="lt1"/>
+          </a:fontRef>
+        </p:style>
+        <p:txBody>
+          <a:bodyPr rtlCol="0" anchor="ctr"/>
+          <a:lstStyle/>
+          <a:p>
+            <a:pPr algn="ctr"/>
+            <a:endParaRPr lang="en-US"/>
+          </a:p>
+        </p:txBody>
+      </p:sp>
+      <p:sp>
+        <p:nvSpPr>
+          <p:cNvPr id="75" name="Rectangle 74"/>
+          <p:cNvSpPr/>
+          <p:nvPr/>
+        </p:nvSpPr>
+        <p:spPr>
+          <a:xfrm>
+            <a:off x="1066800" y="2667000"/>
+            <a:ext cx="3276600" cy="990600"/>
+          </a:xfrm>
+          <a:prstGeom prst="rect">
+            <a:avLst/>
+          </a:prstGeom>
+          <a:solidFill>
+            <a:schemeClr val="bg2">
+              <a:lumMod val="75000"/>
+              <a:alpha val="58000"/>
+            </a:schemeClr>
+          </a:solidFill>
+          <a:ln>
+            <a:noFill/>
+          </a:ln>
+        </p:spPr>
+        <p:style>
+          <a:lnRef idx="2">
+            <a:schemeClr val="accent1">
+              <a:shade val="50000"/>
+            </a:schemeClr>
+          </a:lnRef>
+          <a:fillRef idx="1">
+            <a:schemeClr val="accent1"/>
+          </a:fillRef>
+          <a:effectRef idx="0">
+            <a:schemeClr val="accent1"/>
+          </a:effectRef>
+          <a:fontRef idx="minor">
+            <a:schemeClr val="lt1"/>
+          </a:fontRef>
+        </p:style>
+        <p:txBody>
+          <a:bodyPr rtlCol="0" anchor="ctr"/>
+          <a:lstStyle/>
+          <a:p>
+            <a:pPr algn="ctr"/>
+            <a:endParaRPr lang="en-US"/>
+          </a:p>
+        </p:txBody>
+      </p:sp>
+    </p:spTree>
+    <p:extLst>
+      <p:ext uri="{BB962C8B-B14F-4D97-AF65-F5344CB8AC3E}">
+        <p14:creationId xmlns:p14="http://schemas.microsoft.com/office/powerpoint/2010/main" val="2500679143"/>
+      </p:ext>
+    </p:extLst>
+  </p:cSld>
+  <p:clrMapOvr>
+    <a:masterClrMapping/>
+  </p:clrMapOvr>
+  <p:timing>
+    <p:tnLst>
+      <p:par>
+        <p:cTn xmlns:p14="http://schemas.microsoft.com/office/powerpoint/2010/main" id="1" dur="indefinite" restart="never" nodeType="tmRoot"/>
       </p:par>
     </p:tnLst>
   </p:timing>

</xml_diff>